<commit_message>
modify binary search post
</commit_message>
<xml_diff>
--- a/assets/images/이분탐색/이분탐색.pptx
+++ b/assets/images/이분탐색/이분탐색.pptx
@@ -24,6 +24,10 @@
     <p:sldId id="281" r:id="rId18"/>
     <p:sldId id="282" r:id="rId19"/>
     <p:sldId id="283" r:id="rId20"/>
+    <p:sldId id="284" r:id="rId21"/>
+    <p:sldId id="285" r:id="rId22"/>
+    <p:sldId id="286" r:id="rId23"/>
+    <p:sldId id="287" r:id="rId24"/>
   </p:sldIdLst>
   <p:sldSz cx="12192000" cy="6858000"/>
   <p:notesSz cx="6858000" cy="9144000"/>
@@ -133,13 +137,514 @@
 <file path=ppt/revisionInfo.xml><?xml version="1.0" encoding="utf-8"?>
 <p1510:revInfo xmlns:a="http://schemas.openxmlformats.org/drawingml/2006/main" xmlns:r="http://schemas.openxmlformats.org/officeDocument/2006/relationships" xmlns:p1510="http://schemas.microsoft.com/office/powerpoint/2015/10/main">
   <p1510:revLst>
-    <p1510:client id="{EDFDAAC6-7FFE-4599-A206-F831CD19048E}" v="170" dt="2021-07-29T17:54:37.639"/>
+    <p1510:client id="{0D6F8B4C-DB98-48EF-BF61-3F15AF4D3119}" v="33" dt="2022-07-06T13:36:51.768"/>
   </p1510:revLst>
 </p1510:revInfo>
 </file>
 
 <file path=ppt/changesInfos/changesInfo1.xml><?xml version="1.0" encoding="utf-8"?>
 <pc:chgInfo xmlns:a="http://schemas.openxmlformats.org/drawingml/2006/main" xmlns:r="http://schemas.openxmlformats.org/officeDocument/2006/relationships" xmlns:ac="http://schemas.microsoft.com/office/drawing/2013/main/command" xmlns:pc="http://schemas.microsoft.com/office/powerpoint/2013/main/command">
+  <pc:docChgLst>
+    <pc:chgData name="노태현" userId="96c899e7-218f-44fa-88d0-cfd2f9582355" providerId="ADAL" clId="{0D6F8B4C-DB98-48EF-BF61-3F15AF4D3119}"/>
+    <pc:docChg chg="undo custSel addSld modSld">
+      <pc:chgData name="노태현" userId="96c899e7-218f-44fa-88d0-cfd2f9582355" providerId="ADAL" clId="{0D6F8B4C-DB98-48EF-BF61-3F15AF4D3119}" dt="2022-07-06T13:38:20.745" v="489" actId="478"/>
+      <pc:docMkLst>
+        <pc:docMk/>
+      </pc:docMkLst>
+      <pc:sldChg chg="addSp delSp modSp add mod">
+        <pc:chgData name="노태현" userId="96c899e7-218f-44fa-88d0-cfd2f9582355" providerId="ADAL" clId="{0D6F8B4C-DB98-48EF-BF61-3F15AF4D3119}" dt="2022-07-06T12:06:58.699" v="379" actId="14100"/>
+        <pc:sldMkLst>
+          <pc:docMk/>
+          <pc:sldMk cId="3903026860" sldId="284"/>
+        </pc:sldMkLst>
+        <pc:spChg chg="mod">
+          <ac:chgData name="노태현" userId="96c899e7-218f-44fa-88d0-cfd2f9582355" providerId="ADAL" clId="{0D6F8B4C-DB98-48EF-BF61-3F15AF4D3119}" dt="2022-07-06T11:58:02.644" v="103" actId="20577"/>
+          <ac:spMkLst>
+            <pc:docMk/>
+            <pc:sldMk cId="3903026860" sldId="284"/>
+            <ac:spMk id="4" creationId="{0ADD3736-29C5-49A6-8C10-696896947644}"/>
+          </ac:spMkLst>
+        </pc:spChg>
+        <pc:spChg chg="add">
+          <ac:chgData name="노태현" userId="96c899e7-218f-44fa-88d0-cfd2f9582355" providerId="ADAL" clId="{0D6F8B4C-DB98-48EF-BF61-3F15AF4D3119}" dt="2022-07-06T11:58:45.502" v="130" actId="11529"/>
+          <ac:spMkLst>
+            <pc:docMk/>
+            <pc:sldMk cId="3903026860" sldId="284"/>
+            <ac:spMk id="9" creationId="{C8A270D0-9758-B56B-AEF5-E3690431D68F}"/>
+          </ac:spMkLst>
+        </pc:spChg>
+        <pc:spChg chg="del">
+          <ac:chgData name="노태현" userId="96c899e7-218f-44fa-88d0-cfd2f9582355" providerId="ADAL" clId="{0D6F8B4C-DB98-48EF-BF61-3F15AF4D3119}" dt="2022-07-06T11:56:44.853" v="7" actId="478"/>
+          <ac:spMkLst>
+            <pc:docMk/>
+            <pc:sldMk cId="3903026860" sldId="284"/>
+            <ac:spMk id="12" creationId="{B91B1438-E312-40DB-8D70-E50488784FB4}"/>
+          </ac:spMkLst>
+        </pc:spChg>
+        <pc:spChg chg="del">
+          <ac:chgData name="노태현" userId="96c899e7-218f-44fa-88d0-cfd2f9582355" providerId="ADAL" clId="{0D6F8B4C-DB98-48EF-BF61-3F15AF4D3119}" dt="2022-07-06T11:56:48.910" v="8" actId="478"/>
+          <ac:spMkLst>
+            <pc:docMk/>
+            <pc:sldMk cId="3903026860" sldId="284"/>
+            <ac:spMk id="18" creationId="{265AB843-77B0-46DD-A5D6-6003042E9182}"/>
+          </ac:spMkLst>
+        </pc:spChg>
+        <pc:spChg chg="del">
+          <ac:chgData name="노태현" userId="96c899e7-218f-44fa-88d0-cfd2f9582355" providerId="ADAL" clId="{0D6F8B4C-DB98-48EF-BF61-3F15AF4D3119}" dt="2022-07-06T11:56:44.853" v="7" actId="478"/>
+          <ac:spMkLst>
+            <pc:docMk/>
+            <pc:sldMk cId="3903026860" sldId="284"/>
+            <ac:spMk id="26" creationId="{530AE977-BECF-45B7-ABDA-2188D609CB79}"/>
+          </ac:spMkLst>
+        </pc:spChg>
+        <pc:spChg chg="mod">
+          <ac:chgData name="노태현" userId="96c899e7-218f-44fa-88d0-cfd2f9582355" providerId="ADAL" clId="{0D6F8B4C-DB98-48EF-BF61-3F15AF4D3119}" dt="2022-07-06T12:06:01.966" v="343" actId="20577"/>
+          <ac:spMkLst>
+            <pc:docMk/>
+            <pc:sldMk cId="3903026860" sldId="284"/>
+            <ac:spMk id="29" creationId="{F36F3938-6EEB-4BC7-A4C5-F91AB9023855}"/>
+          </ac:spMkLst>
+        </pc:spChg>
+        <pc:spChg chg="mod">
+          <ac:chgData name="노태현" userId="96c899e7-218f-44fa-88d0-cfd2f9582355" providerId="ADAL" clId="{0D6F8B4C-DB98-48EF-BF61-3F15AF4D3119}" dt="2022-07-06T12:06:04.463" v="346" actId="20577"/>
+          <ac:spMkLst>
+            <pc:docMk/>
+            <pc:sldMk cId="3903026860" sldId="284"/>
+            <ac:spMk id="30" creationId="{45CFF3A7-CD76-46AB-813C-298CA0B6AF99}"/>
+          </ac:spMkLst>
+        </pc:spChg>
+        <pc:spChg chg="add mod">
+          <ac:chgData name="노태현" userId="96c899e7-218f-44fa-88d0-cfd2f9582355" providerId="ADAL" clId="{0D6F8B4C-DB98-48EF-BF61-3F15AF4D3119}" dt="2022-07-06T12:06:23.571" v="362" actId="1076"/>
+          <ac:spMkLst>
+            <pc:docMk/>
+            <pc:sldMk cId="3903026860" sldId="284"/>
+            <ac:spMk id="34" creationId="{7DD4B1BE-0703-7E54-6FFE-209E7AA4B0A1}"/>
+          </ac:spMkLst>
+        </pc:spChg>
+        <pc:spChg chg="add mod">
+          <ac:chgData name="노태현" userId="96c899e7-218f-44fa-88d0-cfd2f9582355" providerId="ADAL" clId="{0D6F8B4C-DB98-48EF-BF61-3F15AF4D3119}" dt="2022-07-06T12:06:44.424" v="376" actId="20577"/>
+          <ac:spMkLst>
+            <pc:docMk/>
+            <pc:sldMk cId="3903026860" sldId="284"/>
+            <ac:spMk id="36" creationId="{8245B394-CF92-7176-162A-00506AF38ED7}"/>
+          </ac:spMkLst>
+        </pc:spChg>
+        <pc:spChg chg="add del mod">
+          <ac:chgData name="노태현" userId="96c899e7-218f-44fa-88d0-cfd2f9582355" providerId="ADAL" clId="{0D6F8B4C-DB98-48EF-BF61-3F15AF4D3119}" dt="2022-07-06T12:06:34.369" v="364" actId="478"/>
+          <ac:spMkLst>
+            <pc:docMk/>
+            <pc:sldMk cId="3903026860" sldId="284"/>
+            <ac:spMk id="40" creationId="{6CFABF76-85CC-78D7-ACD0-1398394476DA}"/>
+          </ac:spMkLst>
+        </pc:spChg>
+        <pc:spChg chg="add del mod">
+          <ac:chgData name="노태현" userId="96c899e7-218f-44fa-88d0-cfd2f9582355" providerId="ADAL" clId="{0D6F8B4C-DB98-48EF-BF61-3F15AF4D3119}" dt="2022-07-06T12:06:32.604" v="363" actId="478"/>
+          <ac:spMkLst>
+            <pc:docMk/>
+            <pc:sldMk cId="3903026860" sldId="284"/>
+            <ac:spMk id="41" creationId="{B4D50246-D570-0F61-26A4-7D5DA915B6BC}"/>
+          </ac:spMkLst>
+        </pc:spChg>
+        <pc:graphicFrameChg chg="del">
+          <ac:chgData name="노태현" userId="96c899e7-218f-44fa-88d0-cfd2f9582355" providerId="ADAL" clId="{0D6F8B4C-DB98-48EF-BF61-3F15AF4D3119}" dt="2022-07-06T11:56:48.910" v="8" actId="478"/>
+          <ac:graphicFrameMkLst>
+            <pc:docMk/>
+            <pc:sldMk cId="3903026860" sldId="284"/>
+            <ac:graphicFrameMk id="2" creationId="{E3C2322C-EA36-4B51-B7C7-33698BB35771}"/>
+          </ac:graphicFrameMkLst>
+        </pc:graphicFrameChg>
+        <pc:cxnChg chg="add mod">
+          <ac:chgData name="노태현" userId="96c899e7-218f-44fa-88d0-cfd2f9582355" providerId="ADAL" clId="{0D6F8B4C-DB98-48EF-BF61-3F15AF4D3119}" dt="2022-07-06T12:06:49.676" v="377" actId="14100"/>
+          <ac:cxnSpMkLst>
+            <pc:docMk/>
+            <pc:sldMk cId="3903026860" sldId="284"/>
+            <ac:cxnSpMk id="5" creationId="{500FCA9F-1360-F371-4DA8-80306E74429F}"/>
+          </ac:cxnSpMkLst>
+        </pc:cxnChg>
+        <pc:cxnChg chg="add del mod">
+          <ac:chgData name="노태현" userId="96c899e7-218f-44fa-88d0-cfd2f9582355" providerId="ADAL" clId="{0D6F8B4C-DB98-48EF-BF61-3F15AF4D3119}" dt="2022-07-06T12:00:59.944" v="254" actId="478"/>
+          <ac:cxnSpMkLst>
+            <pc:docMk/>
+            <pc:sldMk cId="3903026860" sldId="284"/>
+            <ac:cxnSpMk id="11" creationId="{523E1482-31B9-164D-13DF-ED4FF33BAABC}"/>
+          </ac:cxnSpMkLst>
+        </pc:cxnChg>
+        <pc:cxnChg chg="add del mod">
+          <ac:chgData name="노태현" userId="96c899e7-218f-44fa-88d0-cfd2f9582355" providerId="ADAL" clId="{0D6F8B4C-DB98-48EF-BF61-3F15AF4D3119}" dt="2022-07-06T12:00:59.944" v="254" actId="478"/>
+          <ac:cxnSpMkLst>
+            <pc:docMk/>
+            <pc:sldMk cId="3903026860" sldId="284"/>
+            <ac:cxnSpMk id="13" creationId="{07CD0C62-6F1F-DCE4-521C-83E3945B8867}"/>
+          </ac:cxnSpMkLst>
+        </pc:cxnChg>
+        <pc:cxnChg chg="add del mod">
+          <ac:chgData name="노태현" userId="96c899e7-218f-44fa-88d0-cfd2f9582355" providerId="ADAL" clId="{0D6F8B4C-DB98-48EF-BF61-3F15AF4D3119}" dt="2022-07-06T12:00:59.944" v="254" actId="478"/>
+          <ac:cxnSpMkLst>
+            <pc:docMk/>
+            <pc:sldMk cId="3903026860" sldId="284"/>
+            <ac:cxnSpMk id="14" creationId="{928E671E-A64E-65B6-3D76-4D2AAAFD73CC}"/>
+          </ac:cxnSpMkLst>
+        </pc:cxnChg>
+        <pc:cxnChg chg="add mod">
+          <ac:chgData name="노태현" userId="96c899e7-218f-44fa-88d0-cfd2f9582355" providerId="ADAL" clId="{0D6F8B4C-DB98-48EF-BF61-3F15AF4D3119}" dt="2022-07-06T12:01:40.377" v="281" actId="14100"/>
+          <ac:cxnSpMkLst>
+            <pc:docMk/>
+            <pc:sldMk cId="3903026860" sldId="284"/>
+            <ac:cxnSpMk id="19" creationId="{DA14E23F-49FE-5F7C-EA74-14CA3188E6D1}"/>
+          </ac:cxnSpMkLst>
+        </pc:cxnChg>
+        <pc:cxnChg chg="add mod">
+          <ac:chgData name="노태현" userId="96c899e7-218f-44fa-88d0-cfd2f9582355" providerId="ADAL" clId="{0D6F8B4C-DB98-48EF-BF61-3F15AF4D3119}" dt="2022-07-06T12:01:55.612" v="295" actId="1076"/>
+          <ac:cxnSpMkLst>
+            <pc:docMk/>
+            <pc:sldMk cId="3903026860" sldId="284"/>
+            <ac:cxnSpMk id="20" creationId="{F87BE8AA-D3F8-9F97-2E8C-0C5C30DA3A98}"/>
+          </ac:cxnSpMkLst>
+        </pc:cxnChg>
+        <pc:cxnChg chg="add del mod">
+          <ac:chgData name="노태현" userId="96c899e7-218f-44fa-88d0-cfd2f9582355" providerId="ADAL" clId="{0D6F8B4C-DB98-48EF-BF61-3F15AF4D3119}" dt="2022-07-06T12:06:32.604" v="363" actId="478"/>
+          <ac:cxnSpMkLst>
+            <pc:docMk/>
+            <pc:sldMk cId="3903026860" sldId="284"/>
+            <ac:cxnSpMk id="21" creationId="{7818BE32-B4B5-80F9-8DA5-56F90A5537C7}"/>
+          </ac:cxnSpMkLst>
+        </pc:cxnChg>
+        <pc:cxnChg chg="add del mod">
+          <ac:chgData name="노태현" userId="96c899e7-218f-44fa-88d0-cfd2f9582355" providerId="ADAL" clId="{0D6F8B4C-DB98-48EF-BF61-3F15AF4D3119}" dt="2022-07-06T12:01:18.303" v="262" actId="478"/>
+          <ac:cxnSpMkLst>
+            <pc:docMk/>
+            <pc:sldMk cId="3903026860" sldId="284"/>
+            <ac:cxnSpMk id="22" creationId="{6AA6A3AA-C7A1-5FDA-C1A3-E976FEBA47BD}"/>
+          </ac:cxnSpMkLst>
+        </pc:cxnChg>
+        <pc:cxnChg chg="add mod">
+          <ac:chgData name="노태현" userId="96c899e7-218f-44fa-88d0-cfd2f9582355" providerId="ADAL" clId="{0D6F8B4C-DB98-48EF-BF61-3F15AF4D3119}" dt="2022-07-06T12:06:55.164" v="378" actId="14100"/>
+          <ac:cxnSpMkLst>
+            <pc:docMk/>
+            <pc:sldMk cId="3903026860" sldId="284"/>
+            <ac:cxnSpMk id="42" creationId="{159297DB-54C7-3443-4631-5F0A30625A6D}"/>
+          </ac:cxnSpMkLst>
+        </pc:cxnChg>
+        <pc:cxnChg chg="add mod">
+          <ac:chgData name="노태현" userId="96c899e7-218f-44fa-88d0-cfd2f9582355" providerId="ADAL" clId="{0D6F8B4C-DB98-48EF-BF61-3F15AF4D3119}" dt="2022-07-06T12:05:53.988" v="339" actId="1076"/>
+          <ac:cxnSpMkLst>
+            <pc:docMk/>
+            <pc:sldMk cId="3903026860" sldId="284"/>
+            <ac:cxnSpMk id="43" creationId="{0B3B75A9-0A7A-0725-EB28-F1862587BDBD}"/>
+          </ac:cxnSpMkLst>
+        </pc:cxnChg>
+        <pc:cxnChg chg="add mod">
+          <ac:chgData name="노태현" userId="96c899e7-218f-44fa-88d0-cfd2f9582355" providerId="ADAL" clId="{0D6F8B4C-DB98-48EF-BF61-3F15AF4D3119}" dt="2022-07-06T12:06:58.699" v="379" actId="14100"/>
+          <ac:cxnSpMkLst>
+            <pc:docMk/>
+            <pc:sldMk cId="3903026860" sldId="284"/>
+            <ac:cxnSpMk id="44" creationId="{4CD7CB36-33F5-426B-7237-198E3FAA845A}"/>
+          </ac:cxnSpMkLst>
+        </pc:cxnChg>
+      </pc:sldChg>
+      <pc:sldChg chg="addSp delSp modSp add mod">
+        <pc:chgData name="노태현" userId="96c899e7-218f-44fa-88d0-cfd2f9582355" providerId="ADAL" clId="{0D6F8B4C-DB98-48EF-BF61-3F15AF4D3119}" dt="2022-07-06T12:15:53.672" v="459"/>
+        <pc:sldMkLst>
+          <pc:docMk/>
+          <pc:sldMk cId="3439022893" sldId="285"/>
+        </pc:sldMkLst>
+        <pc:spChg chg="del">
+          <ac:chgData name="노태현" userId="96c899e7-218f-44fa-88d0-cfd2f9582355" providerId="ADAL" clId="{0D6F8B4C-DB98-48EF-BF61-3F15AF4D3119}" dt="2022-07-06T12:10:42.067" v="381" actId="478"/>
+          <ac:spMkLst>
+            <pc:docMk/>
+            <pc:sldMk cId="3439022893" sldId="285"/>
+            <ac:spMk id="9" creationId="{C8A270D0-9758-B56B-AEF5-E3690431D68F}"/>
+          </ac:spMkLst>
+        </pc:spChg>
+        <pc:spChg chg="add del">
+          <ac:chgData name="노태현" userId="96c899e7-218f-44fa-88d0-cfd2f9582355" providerId="ADAL" clId="{0D6F8B4C-DB98-48EF-BF61-3F15AF4D3119}" dt="2022-07-06T12:12:14.343" v="419" actId="11529"/>
+          <ac:spMkLst>
+            <pc:docMk/>
+            <pc:sldMk cId="3439022893" sldId="285"/>
+            <ac:spMk id="15" creationId="{7661C703-35A4-2788-9E03-50FE11BC38EE}"/>
+          </ac:spMkLst>
+        </pc:spChg>
+        <pc:spChg chg="add del mod">
+          <ac:chgData name="노태현" userId="96c899e7-218f-44fa-88d0-cfd2f9582355" providerId="ADAL" clId="{0D6F8B4C-DB98-48EF-BF61-3F15AF4D3119}" dt="2022-07-06T12:12:34.840" v="424" actId="478"/>
+          <ac:spMkLst>
+            <pc:docMk/>
+            <pc:sldMk cId="3439022893" sldId="285"/>
+            <ac:spMk id="16" creationId="{0313A6D8-EE18-FD6E-4B29-934D438F68A1}"/>
+          </ac:spMkLst>
+        </pc:spChg>
+        <pc:spChg chg="add del mod">
+          <ac:chgData name="노태현" userId="96c899e7-218f-44fa-88d0-cfd2f9582355" providerId="ADAL" clId="{0D6F8B4C-DB98-48EF-BF61-3F15AF4D3119}" dt="2022-07-06T12:13:40.434" v="436" actId="478"/>
+          <ac:spMkLst>
+            <pc:docMk/>
+            <pc:sldMk cId="3439022893" sldId="285"/>
+            <ac:spMk id="17" creationId="{744281D1-73CB-7325-B97A-D5FFD17C2BE4}"/>
+          </ac:spMkLst>
+        </pc:spChg>
+        <pc:spChg chg="add del mod">
+          <ac:chgData name="노태현" userId="96c899e7-218f-44fa-88d0-cfd2f9582355" providerId="ADAL" clId="{0D6F8B4C-DB98-48EF-BF61-3F15AF4D3119}" dt="2022-07-06T12:13:39.688" v="435" actId="478"/>
+          <ac:spMkLst>
+            <pc:docMk/>
+            <pc:sldMk cId="3439022893" sldId="285"/>
+            <ac:spMk id="18" creationId="{D7CF7E2A-98C4-BA1F-F7D8-8E545A0C9D69}"/>
+          </ac:spMkLst>
+        </pc:spChg>
+        <pc:spChg chg="add mod">
+          <ac:chgData name="노태현" userId="96c899e7-218f-44fa-88d0-cfd2f9582355" providerId="ADAL" clId="{0D6F8B4C-DB98-48EF-BF61-3F15AF4D3119}" dt="2022-07-06T12:11:35.633" v="399"/>
+          <ac:spMkLst>
+            <pc:docMk/>
+            <pc:sldMk cId="3439022893" sldId="285"/>
+            <ac:spMk id="23" creationId="{5A2547FB-34B1-FA89-7935-6DB082CC8ADD}"/>
+          </ac:spMkLst>
+        </pc:spChg>
+        <pc:spChg chg="add mod">
+          <ac:chgData name="노태현" userId="96c899e7-218f-44fa-88d0-cfd2f9582355" providerId="ADAL" clId="{0D6F8B4C-DB98-48EF-BF61-3F15AF4D3119}" dt="2022-07-06T12:11:49.034" v="415"/>
+          <ac:spMkLst>
+            <pc:docMk/>
+            <pc:sldMk cId="3439022893" sldId="285"/>
+            <ac:spMk id="24" creationId="{054CF5FB-3966-06E5-9F55-E5E7DCDB2DD8}"/>
+          </ac:spMkLst>
+        </pc:spChg>
+        <pc:spChg chg="del">
+          <ac:chgData name="노태현" userId="96c899e7-218f-44fa-88d0-cfd2f9582355" providerId="ADAL" clId="{0D6F8B4C-DB98-48EF-BF61-3F15AF4D3119}" dt="2022-07-06T12:10:42.067" v="381" actId="478"/>
+          <ac:spMkLst>
+            <pc:docMk/>
+            <pc:sldMk cId="3439022893" sldId="285"/>
+            <ac:spMk id="29" creationId="{F36F3938-6EEB-4BC7-A4C5-F91AB9023855}"/>
+          </ac:spMkLst>
+        </pc:spChg>
+        <pc:spChg chg="del">
+          <ac:chgData name="노태현" userId="96c899e7-218f-44fa-88d0-cfd2f9582355" providerId="ADAL" clId="{0D6F8B4C-DB98-48EF-BF61-3F15AF4D3119}" dt="2022-07-06T12:10:42.067" v="381" actId="478"/>
+          <ac:spMkLst>
+            <pc:docMk/>
+            <pc:sldMk cId="3439022893" sldId="285"/>
+            <ac:spMk id="30" creationId="{45CFF3A7-CD76-46AB-813C-298CA0B6AF99}"/>
+          </ac:spMkLst>
+        </pc:spChg>
+        <pc:spChg chg="add del">
+          <ac:chgData name="노태현" userId="96c899e7-218f-44fa-88d0-cfd2f9582355" providerId="ADAL" clId="{0D6F8B4C-DB98-48EF-BF61-3F15AF4D3119}" dt="2022-07-06T12:14:57.719" v="444" actId="478"/>
+          <ac:spMkLst>
+            <pc:docMk/>
+            <pc:sldMk cId="3439022893" sldId="285"/>
+            <ac:spMk id="32" creationId="{ACECC62D-DD6E-20CD-8FF9-AAA2E9BFD422}"/>
+          </ac:spMkLst>
+        </pc:spChg>
+        <pc:spChg chg="add">
+          <ac:chgData name="노태현" userId="96c899e7-218f-44fa-88d0-cfd2f9582355" providerId="ADAL" clId="{0D6F8B4C-DB98-48EF-BF61-3F15AF4D3119}" dt="2022-07-06T12:15:09.625" v="445" actId="11529"/>
+          <ac:spMkLst>
+            <pc:docMk/>
+            <pc:sldMk cId="3439022893" sldId="285"/>
+            <ac:spMk id="33" creationId="{F2D8FC9F-1029-0C50-4A3F-65C0292EBBF0}"/>
+          </ac:spMkLst>
+        </pc:spChg>
+        <pc:spChg chg="del">
+          <ac:chgData name="노태현" userId="96c899e7-218f-44fa-88d0-cfd2f9582355" providerId="ADAL" clId="{0D6F8B4C-DB98-48EF-BF61-3F15AF4D3119}" dt="2022-07-06T12:10:42.067" v="381" actId="478"/>
+          <ac:spMkLst>
+            <pc:docMk/>
+            <pc:sldMk cId="3439022893" sldId="285"/>
+            <ac:spMk id="34" creationId="{7DD4B1BE-0703-7E54-6FFE-209E7AA4B0A1}"/>
+          </ac:spMkLst>
+        </pc:spChg>
+        <pc:spChg chg="del">
+          <ac:chgData name="노태현" userId="96c899e7-218f-44fa-88d0-cfd2f9582355" providerId="ADAL" clId="{0D6F8B4C-DB98-48EF-BF61-3F15AF4D3119}" dt="2022-07-06T12:10:42.067" v="381" actId="478"/>
+          <ac:spMkLst>
+            <pc:docMk/>
+            <pc:sldMk cId="3439022893" sldId="285"/>
+            <ac:spMk id="36" creationId="{8245B394-CF92-7176-162A-00506AF38ED7}"/>
+          </ac:spMkLst>
+        </pc:spChg>
+        <pc:spChg chg="add mod">
+          <ac:chgData name="노태현" userId="96c899e7-218f-44fa-88d0-cfd2f9582355" providerId="ADAL" clId="{0D6F8B4C-DB98-48EF-BF61-3F15AF4D3119}" dt="2022-07-06T12:15:47.257" v="453" actId="1076"/>
+          <ac:spMkLst>
+            <pc:docMk/>
+            <pc:sldMk cId="3439022893" sldId="285"/>
+            <ac:spMk id="45" creationId="{E1D11ADD-1E7F-4E36-FDE4-575554F77123}"/>
+          </ac:spMkLst>
+        </pc:spChg>
+        <pc:spChg chg="add mod">
+          <ac:chgData name="노태현" userId="96c899e7-218f-44fa-88d0-cfd2f9582355" providerId="ADAL" clId="{0D6F8B4C-DB98-48EF-BF61-3F15AF4D3119}" dt="2022-07-06T12:15:53.672" v="459"/>
+          <ac:spMkLst>
+            <pc:docMk/>
+            <pc:sldMk cId="3439022893" sldId="285"/>
+            <ac:spMk id="46" creationId="{CD41A1FA-7938-537E-0E4F-D1BBAA891041}"/>
+          </ac:spMkLst>
+        </pc:spChg>
+        <pc:cxnChg chg="add del mod">
+          <ac:chgData name="노태현" userId="96c899e7-218f-44fa-88d0-cfd2f9582355" providerId="ADAL" clId="{0D6F8B4C-DB98-48EF-BF61-3F15AF4D3119}" dt="2022-07-06T12:11:00.224" v="384" actId="478"/>
+          <ac:cxnSpMkLst>
+            <pc:docMk/>
+            <pc:sldMk cId="3439022893" sldId="285"/>
+            <ac:cxnSpMk id="3" creationId="{26115180-C19D-98B1-4431-8D99F4935067}"/>
+          </ac:cxnSpMkLst>
+        </pc:cxnChg>
+        <pc:cxnChg chg="del">
+          <ac:chgData name="노태현" userId="96c899e7-218f-44fa-88d0-cfd2f9582355" providerId="ADAL" clId="{0D6F8B4C-DB98-48EF-BF61-3F15AF4D3119}" dt="2022-07-06T12:10:42.067" v="381" actId="478"/>
+          <ac:cxnSpMkLst>
+            <pc:docMk/>
+            <pc:sldMk cId="3439022893" sldId="285"/>
+            <ac:cxnSpMk id="5" creationId="{500FCA9F-1360-F371-4DA8-80306E74429F}"/>
+          </ac:cxnSpMkLst>
+        </pc:cxnChg>
+        <pc:cxnChg chg="add mod">
+          <ac:chgData name="노태현" userId="96c899e7-218f-44fa-88d0-cfd2f9582355" providerId="ADAL" clId="{0D6F8B4C-DB98-48EF-BF61-3F15AF4D3119}" dt="2022-07-06T12:11:17.586" v="389" actId="14100"/>
+          <ac:cxnSpMkLst>
+            <pc:docMk/>
+            <pc:sldMk cId="3439022893" sldId="285"/>
+            <ac:cxnSpMk id="7" creationId="{E1A41471-946F-8725-3256-BAD448B060A6}"/>
+          </ac:cxnSpMkLst>
+        </pc:cxnChg>
+        <pc:cxnChg chg="add del">
+          <ac:chgData name="노태현" userId="96c899e7-218f-44fa-88d0-cfd2f9582355" providerId="ADAL" clId="{0D6F8B4C-DB98-48EF-BF61-3F15AF4D3119}" dt="2022-07-06T12:11:56.811" v="417" actId="478"/>
+          <ac:cxnSpMkLst>
+            <pc:docMk/>
+            <pc:sldMk cId="3439022893" sldId="285"/>
+            <ac:cxnSpMk id="14" creationId="{8DCFEC10-807D-AAF4-0793-1FD889F4690C}"/>
+          </ac:cxnSpMkLst>
+        </pc:cxnChg>
+        <pc:cxnChg chg="del">
+          <ac:chgData name="노태현" userId="96c899e7-218f-44fa-88d0-cfd2f9582355" providerId="ADAL" clId="{0D6F8B4C-DB98-48EF-BF61-3F15AF4D3119}" dt="2022-07-06T12:10:42.067" v="381" actId="478"/>
+          <ac:cxnSpMkLst>
+            <pc:docMk/>
+            <pc:sldMk cId="3439022893" sldId="285"/>
+            <ac:cxnSpMk id="19" creationId="{DA14E23F-49FE-5F7C-EA74-14CA3188E6D1}"/>
+          </ac:cxnSpMkLst>
+        </pc:cxnChg>
+        <pc:cxnChg chg="del">
+          <ac:chgData name="노태현" userId="96c899e7-218f-44fa-88d0-cfd2f9582355" providerId="ADAL" clId="{0D6F8B4C-DB98-48EF-BF61-3F15AF4D3119}" dt="2022-07-06T12:10:42.067" v="381" actId="478"/>
+          <ac:cxnSpMkLst>
+            <pc:docMk/>
+            <pc:sldMk cId="3439022893" sldId="285"/>
+            <ac:cxnSpMk id="20" creationId="{F87BE8AA-D3F8-9F97-2E8C-0C5C30DA3A98}"/>
+          </ac:cxnSpMkLst>
+        </pc:cxnChg>
+        <pc:cxnChg chg="add mod">
+          <ac:chgData name="노태현" userId="96c899e7-218f-44fa-88d0-cfd2f9582355" providerId="ADAL" clId="{0D6F8B4C-DB98-48EF-BF61-3F15AF4D3119}" dt="2022-07-06T12:11:24.543" v="392" actId="14100"/>
+          <ac:cxnSpMkLst>
+            <pc:docMk/>
+            <pc:sldMk cId="3439022893" sldId="285"/>
+            <ac:cxnSpMk id="21" creationId="{C114F223-33AD-4042-8123-EEDFCAE5E958}"/>
+          </ac:cxnSpMkLst>
+        </pc:cxnChg>
+        <pc:cxnChg chg="add del mod">
+          <ac:chgData name="노태현" userId="96c899e7-218f-44fa-88d0-cfd2f9582355" providerId="ADAL" clId="{0D6F8B4C-DB98-48EF-BF61-3F15AF4D3119}" dt="2022-07-06T12:14:20.587" v="440" actId="478"/>
+          <ac:cxnSpMkLst>
+            <pc:docMk/>
+            <pc:sldMk cId="3439022893" sldId="285"/>
+            <ac:cxnSpMk id="25" creationId="{613F6DC0-142C-7F01-3FEB-B160B6111260}"/>
+          </ac:cxnSpMkLst>
+        </pc:cxnChg>
+        <pc:cxnChg chg="add del">
+          <ac:chgData name="노태현" userId="96c899e7-218f-44fa-88d0-cfd2f9582355" providerId="ADAL" clId="{0D6F8B4C-DB98-48EF-BF61-3F15AF4D3119}" dt="2022-07-06T12:14:30.937" v="442" actId="478"/>
+          <ac:cxnSpMkLst>
+            <pc:docMk/>
+            <pc:sldMk cId="3439022893" sldId="285"/>
+            <ac:cxnSpMk id="31" creationId="{3D55B09B-4E4C-52D9-C629-A84C108AFBA6}"/>
+          </ac:cxnSpMkLst>
+        </pc:cxnChg>
+        <pc:cxnChg chg="add mod">
+          <ac:chgData name="노태현" userId="96c899e7-218f-44fa-88d0-cfd2f9582355" providerId="ADAL" clId="{0D6F8B4C-DB98-48EF-BF61-3F15AF4D3119}" dt="2022-07-06T12:15:33.235" v="448" actId="13822"/>
+          <ac:cxnSpMkLst>
+            <pc:docMk/>
+            <pc:sldMk cId="3439022893" sldId="285"/>
+            <ac:cxnSpMk id="37" creationId="{344D197E-F6FA-B883-AF5F-3EE55B4B9574}"/>
+          </ac:cxnSpMkLst>
+        </pc:cxnChg>
+        <pc:cxnChg chg="del">
+          <ac:chgData name="노태현" userId="96c899e7-218f-44fa-88d0-cfd2f9582355" providerId="ADAL" clId="{0D6F8B4C-DB98-48EF-BF61-3F15AF4D3119}" dt="2022-07-06T12:10:42.067" v="381" actId="478"/>
+          <ac:cxnSpMkLst>
+            <pc:docMk/>
+            <pc:sldMk cId="3439022893" sldId="285"/>
+            <ac:cxnSpMk id="42" creationId="{159297DB-54C7-3443-4631-5F0A30625A6D}"/>
+          </ac:cxnSpMkLst>
+        </pc:cxnChg>
+        <pc:cxnChg chg="del">
+          <ac:chgData name="노태현" userId="96c899e7-218f-44fa-88d0-cfd2f9582355" providerId="ADAL" clId="{0D6F8B4C-DB98-48EF-BF61-3F15AF4D3119}" dt="2022-07-06T12:10:42.067" v="381" actId="478"/>
+          <ac:cxnSpMkLst>
+            <pc:docMk/>
+            <pc:sldMk cId="3439022893" sldId="285"/>
+            <ac:cxnSpMk id="43" creationId="{0B3B75A9-0A7A-0725-EB28-F1862587BDBD}"/>
+          </ac:cxnSpMkLst>
+        </pc:cxnChg>
+        <pc:cxnChg chg="del">
+          <ac:chgData name="노태현" userId="96c899e7-218f-44fa-88d0-cfd2f9582355" providerId="ADAL" clId="{0D6F8B4C-DB98-48EF-BF61-3F15AF4D3119}" dt="2022-07-06T12:10:42.067" v="381" actId="478"/>
+          <ac:cxnSpMkLst>
+            <pc:docMk/>
+            <pc:sldMk cId="3439022893" sldId="285"/>
+            <ac:cxnSpMk id="44" creationId="{4CD7CB36-33F5-426B-7237-198E3FAA845A}"/>
+          </ac:cxnSpMkLst>
+        </pc:cxnChg>
+      </pc:sldChg>
+      <pc:sldChg chg="addSp modSp add mod">
+        <pc:chgData name="노태현" userId="96c899e7-218f-44fa-88d0-cfd2f9582355" providerId="ADAL" clId="{0D6F8B4C-DB98-48EF-BF61-3F15AF4D3119}" dt="2022-07-06T13:37:04.650" v="487" actId="1076"/>
+        <pc:sldMkLst>
+          <pc:docMk/>
+          <pc:sldMk cId="2136106483" sldId="286"/>
+        </pc:sldMkLst>
+        <pc:spChg chg="add mod">
+          <ac:chgData name="노태현" userId="96c899e7-218f-44fa-88d0-cfd2f9582355" providerId="ADAL" clId="{0D6F8B4C-DB98-48EF-BF61-3F15AF4D3119}" dt="2022-07-06T13:36:22.846" v="469" actId="20577"/>
+          <ac:spMkLst>
+            <pc:docMk/>
+            <pc:sldMk cId="2136106483" sldId="286"/>
+            <ac:spMk id="13" creationId="{D8AE0244-E602-D57C-FB3E-042D6C2AC86B}"/>
+          </ac:spMkLst>
+        </pc:spChg>
+        <pc:spChg chg="add mod">
+          <ac:chgData name="노태현" userId="96c899e7-218f-44fa-88d0-cfd2f9582355" providerId="ADAL" clId="{0D6F8B4C-DB98-48EF-BF61-3F15AF4D3119}" dt="2022-07-06T13:36:40.350" v="477" actId="20577"/>
+          <ac:spMkLst>
+            <pc:docMk/>
+            <pc:sldMk cId="2136106483" sldId="286"/>
+            <ac:spMk id="15" creationId="{F2A9B206-0F4B-D802-4F26-CD2136578072}"/>
+          </ac:spMkLst>
+        </pc:spChg>
+        <pc:spChg chg="add mod">
+          <ac:chgData name="노태현" userId="96c899e7-218f-44fa-88d0-cfd2f9582355" providerId="ADAL" clId="{0D6F8B4C-DB98-48EF-BF61-3F15AF4D3119}" dt="2022-07-06T13:37:04.650" v="487" actId="1076"/>
+          <ac:spMkLst>
+            <pc:docMk/>
+            <pc:sldMk cId="2136106483" sldId="286"/>
+            <ac:spMk id="17" creationId="{93DA027F-2A57-72E0-16D0-C1B4595A7B30}"/>
+          </ac:spMkLst>
+        </pc:spChg>
+        <pc:cxnChg chg="add mod">
+          <ac:chgData name="노태현" userId="96c899e7-218f-44fa-88d0-cfd2f9582355" providerId="ADAL" clId="{0D6F8B4C-DB98-48EF-BF61-3F15AF4D3119}" dt="2022-07-06T13:36:20.632" v="467" actId="208"/>
+          <ac:cxnSpMkLst>
+            <pc:docMk/>
+            <pc:sldMk cId="2136106483" sldId="286"/>
+            <ac:cxnSpMk id="3" creationId="{4280083F-BE9C-BB55-6AB7-65DCCDC3641D}"/>
+          </ac:cxnSpMkLst>
+        </pc:cxnChg>
+        <pc:cxnChg chg="add mod">
+          <ac:chgData name="노태현" userId="96c899e7-218f-44fa-88d0-cfd2f9582355" providerId="ADAL" clId="{0D6F8B4C-DB98-48EF-BF61-3F15AF4D3119}" dt="2022-07-06T13:36:30.170" v="471" actId="1076"/>
+          <ac:cxnSpMkLst>
+            <pc:docMk/>
+            <pc:sldMk cId="2136106483" sldId="286"/>
+            <ac:cxnSpMk id="14" creationId="{A35414BB-B248-16B7-A9E3-BDAB20078DF2}"/>
+          </ac:cxnSpMkLst>
+        </pc:cxnChg>
+        <pc:cxnChg chg="add mod">
+          <ac:chgData name="노태현" userId="96c899e7-218f-44fa-88d0-cfd2f9582355" providerId="ADAL" clId="{0D6F8B4C-DB98-48EF-BF61-3F15AF4D3119}" dt="2022-07-06T13:36:49.058" v="481" actId="1035"/>
+          <ac:cxnSpMkLst>
+            <pc:docMk/>
+            <pc:sldMk cId="2136106483" sldId="286"/>
+            <ac:cxnSpMk id="16" creationId="{475D044C-D8A3-816E-55D6-CAD9DC23A322}"/>
+          </ac:cxnSpMkLst>
+        </pc:cxnChg>
+      </pc:sldChg>
+      <pc:sldChg chg="delSp add mod">
+        <pc:chgData name="노태현" userId="96c899e7-218f-44fa-88d0-cfd2f9582355" providerId="ADAL" clId="{0D6F8B4C-DB98-48EF-BF61-3F15AF4D3119}" dt="2022-07-06T13:38:20.745" v="489" actId="478"/>
+        <pc:sldMkLst>
+          <pc:docMk/>
+          <pc:sldMk cId="2933344826" sldId="287"/>
+        </pc:sldMkLst>
+        <pc:spChg chg="del">
+          <ac:chgData name="노태현" userId="96c899e7-218f-44fa-88d0-cfd2f9582355" providerId="ADAL" clId="{0D6F8B4C-DB98-48EF-BF61-3F15AF4D3119}" dt="2022-07-06T13:38:20.745" v="489" actId="478"/>
+          <ac:spMkLst>
+            <pc:docMk/>
+            <pc:sldMk cId="2933344826" sldId="287"/>
+            <ac:spMk id="4" creationId="{0ADD3736-29C5-49A6-8C10-696896947644}"/>
+          </ac:spMkLst>
+        </pc:spChg>
+      </pc:sldChg>
+    </pc:docChg>
+  </pc:docChgLst>
   <pc:docChgLst>
     <pc:chgData name="noh taehyun" userId="26ea3cd8016ad7de" providerId="LiveId" clId="{EDFDAAC6-7FFE-4599-A206-F831CD19048E}"/>
     <pc:docChg chg="undo custSel addSld modSld">
@@ -763,7 +1268,7 @@
           <a:p>
             <a:fld id="{16706E4F-4DCE-433C-BE47-3B753ED43087}" type="datetimeFigureOut">
               <a:rPr lang="ko-KR" altLang="en-US" smtClean="0"/>
-              <a:t>2021-08-05</a:t>
+              <a:t>2022-07-06</a:t>
             </a:fld>
             <a:endParaRPr lang="ko-KR" altLang="en-US"/>
           </a:p>
@@ -961,7 +1466,7 @@
           <a:p>
             <a:fld id="{16706E4F-4DCE-433C-BE47-3B753ED43087}" type="datetimeFigureOut">
               <a:rPr lang="ko-KR" altLang="en-US" smtClean="0"/>
-              <a:t>2021-08-05</a:t>
+              <a:t>2022-07-06</a:t>
             </a:fld>
             <a:endParaRPr lang="ko-KR" altLang="en-US"/>
           </a:p>
@@ -1169,7 +1674,7 @@
           <a:p>
             <a:fld id="{16706E4F-4DCE-433C-BE47-3B753ED43087}" type="datetimeFigureOut">
               <a:rPr lang="ko-KR" altLang="en-US" smtClean="0"/>
-              <a:t>2021-08-05</a:t>
+              <a:t>2022-07-06</a:t>
             </a:fld>
             <a:endParaRPr lang="ko-KR" altLang="en-US"/>
           </a:p>
@@ -1367,7 +1872,7 @@
           <a:p>
             <a:fld id="{16706E4F-4DCE-433C-BE47-3B753ED43087}" type="datetimeFigureOut">
               <a:rPr lang="ko-KR" altLang="en-US" smtClean="0"/>
-              <a:t>2021-08-05</a:t>
+              <a:t>2022-07-06</a:t>
             </a:fld>
             <a:endParaRPr lang="ko-KR" altLang="en-US"/>
           </a:p>
@@ -1642,7 +2147,7 @@
           <a:p>
             <a:fld id="{16706E4F-4DCE-433C-BE47-3B753ED43087}" type="datetimeFigureOut">
               <a:rPr lang="ko-KR" altLang="en-US" smtClean="0"/>
-              <a:t>2021-08-05</a:t>
+              <a:t>2022-07-06</a:t>
             </a:fld>
             <a:endParaRPr lang="ko-KR" altLang="en-US"/>
           </a:p>
@@ -1907,7 +2412,7 @@
           <a:p>
             <a:fld id="{16706E4F-4DCE-433C-BE47-3B753ED43087}" type="datetimeFigureOut">
               <a:rPr lang="ko-KR" altLang="en-US" smtClean="0"/>
-              <a:t>2021-08-05</a:t>
+              <a:t>2022-07-06</a:t>
             </a:fld>
             <a:endParaRPr lang="ko-KR" altLang="en-US"/>
           </a:p>
@@ -2319,7 +2824,7 @@
           <a:p>
             <a:fld id="{16706E4F-4DCE-433C-BE47-3B753ED43087}" type="datetimeFigureOut">
               <a:rPr lang="ko-KR" altLang="en-US" smtClean="0"/>
-              <a:t>2021-08-05</a:t>
+              <a:t>2022-07-06</a:t>
             </a:fld>
             <a:endParaRPr lang="ko-KR" altLang="en-US"/>
           </a:p>
@@ -2460,7 +2965,7 @@
           <a:p>
             <a:fld id="{16706E4F-4DCE-433C-BE47-3B753ED43087}" type="datetimeFigureOut">
               <a:rPr lang="ko-KR" altLang="en-US" smtClean="0"/>
-              <a:t>2021-08-05</a:t>
+              <a:t>2022-07-06</a:t>
             </a:fld>
             <a:endParaRPr lang="ko-KR" altLang="en-US"/>
           </a:p>
@@ -2573,7 +3078,7 @@
           <a:p>
             <a:fld id="{16706E4F-4DCE-433C-BE47-3B753ED43087}" type="datetimeFigureOut">
               <a:rPr lang="ko-KR" altLang="en-US" smtClean="0"/>
-              <a:t>2021-08-05</a:t>
+              <a:t>2022-07-06</a:t>
             </a:fld>
             <a:endParaRPr lang="ko-KR" altLang="en-US"/>
           </a:p>
@@ -2884,7 +3389,7 @@
           <a:p>
             <a:fld id="{16706E4F-4DCE-433C-BE47-3B753ED43087}" type="datetimeFigureOut">
               <a:rPr lang="ko-KR" altLang="en-US" smtClean="0"/>
-              <a:t>2021-08-05</a:t>
+              <a:t>2022-07-06</a:t>
             </a:fld>
             <a:endParaRPr lang="ko-KR" altLang="en-US"/>
           </a:p>
@@ -3172,7 +3677,7 @@
           <a:p>
             <a:fld id="{16706E4F-4DCE-433C-BE47-3B753ED43087}" type="datetimeFigureOut">
               <a:rPr lang="ko-KR" altLang="en-US" smtClean="0"/>
-              <a:t>2021-08-05</a:t>
+              <a:t>2022-07-06</a:t>
             </a:fld>
             <a:endParaRPr lang="ko-KR" altLang="en-US"/>
           </a:p>
@@ -3413,7 +3918,7 @@
           <a:p>
             <a:fld id="{16706E4F-4DCE-433C-BE47-3B753ED43087}" type="datetimeFigureOut">
               <a:rPr lang="ko-KR" altLang="en-US" smtClean="0"/>
-              <a:t>2021-08-05</a:t>
+              <a:t>2022-07-06</a:t>
             </a:fld>
             <a:endParaRPr lang="ko-KR" altLang="en-US"/>
           </a:p>
@@ -12860,6 +13365,2584 @@
 </p:sld>
 </file>
 
+<file path=ppt/slides/slide20.xml><?xml version="1.0" encoding="utf-8"?>
+<p:sld xmlns:a="http://schemas.openxmlformats.org/drawingml/2006/main" xmlns:r="http://schemas.openxmlformats.org/officeDocument/2006/relationships" xmlns:p="http://schemas.openxmlformats.org/presentationml/2006/main">
+  <p:cSld>
+    <p:bg>
+      <p:bgPr>
+        <a:solidFill>
+          <a:schemeClr val="tx2">
+            <a:lumMod val="50000"/>
+          </a:schemeClr>
+        </a:solidFill>
+        <a:effectLst/>
+      </p:bgPr>
+    </p:bg>
+    <p:spTree>
+      <p:nvGrpSpPr>
+        <p:cNvPr id="1" name=""/>
+        <p:cNvGrpSpPr/>
+        <p:nvPr/>
+      </p:nvGrpSpPr>
+      <p:grpSpPr>
+        <a:xfrm>
+          <a:off x="0" y="0"/>
+          <a:ext cx="0" cy="0"/>
+          <a:chOff x="0" y="0"/>
+          <a:chExt cx="0" cy="0"/>
+        </a:xfrm>
+      </p:grpSpPr>
+      <p:sp>
+        <p:nvSpPr>
+          <p:cNvPr id="4" name="TextBox 3">
+            <a:extLst>
+              <a:ext uri="{FF2B5EF4-FFF2-40B4-BE49-F238E27FC236}">
+                <a16:creationId xmlns:a16="http://schemas.microsoft.com/office/drawing/2014/main" id="{0ADD3736-29C5-49A6-8C10-696896947644}"/>
+              </a:ext>
+            </a:extLst>
+          </p:cNvPr>
+          <p:cNvSpPr txBox="1"/>
+          <p:nvPr/>
+        </p:nvSpPr>
+        <p:spPr>
+          <a:xfrm>
+            <a:off x="312821" y="312821"/>
+            <a:ext cx="11228892" cy="584775"/>
+          </a:xfrm>
+          <a:prstGeom prst="rect">
+            <a:avLst/>
+          </a:prstGeom>
+          <a:noFill/>
+        </p:spPr>
+        <p:txBody>
+          <a:bodyPr wrap="square" rtlCol="0">
+            <a:spAutoFit/>
+          </a:bodyPr>
+          <a:lstStyle/>
+          <a:p>
+            <a:r>
+              <a:rPr lang="ko-KR" altLang="en-US" sz="3200" dirty="0">
+                <a:solidFill>
+                  <a:schemeClr val="bg1"/>
+                </a:solidFill>
+              </a:rPr>
+              <a:t>● </a:t>
+            </a:r>
+            <a:r>
+              <a:rPr lang="en-US" altLang="ko-KR" sz="3200" dirty="0" err="1">
+                <a:solidFill>
+                  <a:schemeClr val="bg1"/>
+                </a:solidFill>
+              </a:rPr>
+              <a:t>Boj</a:t>
+            </a:r>
+            <a:r>
+              <a:rPr lang="en-US" altLang="ko-KR" sz="3200" dirty="0">
+                <a:solidFill>
+                  <a:schemeClr val="bg1"/>
+                </a:solidFill>
+              </a:rPr>
+              <a:t> – 1654 </a:t>
+            </a:r>
+            <a:r>
+              <a:rPr lang="ko-KR" altLang="en-US" sz="3200" dirty="0" err="1">
+                <a:solidFill>
+                  <a:schemeClr val="bg1"/>
+                </a:solidFill>
+              </a:rPr>
+              <a:t>랜선</a:t>
+            </a:r>
+            <a:r>
+              <a:rPr lang="ko-KR" altLang="en-US" sz="3200" dirty="0">
+                <a:solidFill>
+                  <a:schemeClr val="bg1"/>
+                </a:solidFill>
+              </a:rPr>
+              <a:t> 자르기</a:t>
+            </a:r>
+            <a:r>
+              <a:rPr lang="en-US" altLang="ko-KR" sz="3200" dirty="0">
+                <a:solidFill>
+                  <a:schemeClr val="bg1"/>
+                </a:solidFill>
+              </a:rPr>
+              <a:t>.</a:t>
+            </a:r>
+            <a:endParaRPr lang="ko-KR" altLang="en-US" sz="3200" dirty="0">
+              <a:solidFill>
+                <a:schemeClr val="bg1"/>
+              </a:solidFill>
+            </a:endParaRPr>
+          </a:p>
+        </p:txBody>
+      </p:sp>
+      <p:sp>
+        <p:nvSpPr>
+          <p:cNvPr id="29" name="TextBox 28">
+            <a:extLst>
+              <a:ext uri="{FF2B5EF4-FFF2-40B4-BE49-F238E27FC236}">
+                <a16:creationId xmlns:a16="http://schemas.microsoft.com/office/drawing/2014/main" id="{F36F3938-6EEB-4BC7-A4C5-F91AB9023855}"/>
+              </a:ext>
+            </a:extLst>
+          </p:cNvPr>
+          <p:cNvSpPr txBox="1"/>
+          <p:nvPr/>
+        </p:nvSpPr>
+        <p:spPr>
+          <a:xfrm>
+            <a:off x="1331506" y="1621211"/>
+            <a:ext cx="2197756" cy="584775"/>
+          </a:xfrm>
+          <a:prstGeom prst="rect">
+            <a:avLst/>
+          </a:prstGeom>
+          <a:noFill/>
+        </p:spPr>
+        <p:txBody>
+          <a:bodyPr wrap="square" rtlCol="0">
+            <a:spAutoFit/>
+          </a:bodyPr>
+          <a:lstStyle/>
+          <a:p>
+            <a:r>
+              <a:rPr lang="en-US" altLang="ko-KR" sz="3200" dirty="0">
+                <a:solidFill>
+                  <a:schemeClr val="bg1"/>
+                </a:solidFill>
+              </a:rPr>
+              <a:t>4</a:t>
+            </a:r>
+            <a:r>
+              <a:rPr lang="ko-KR" altLang="en-US" sz="3200" dirty="0">
+                <a:solidFill>
+                  <a:schemeClr val="bg1"/>
+                </a:solidFill>
+              </a:rPr>
+              <a:t>개의 </a:t>
+            </a:r>
+            <a:r>
+              <a:rPr lang="ko-KR" altLang="en-US" sz="3200" dirty="0" err="1">
+                <a:solidFill>
+                  <a:schemeClr val="bg1"/>
+                </a:solidFill>
+              </a:rPr>
+              <a:t>랜선</a:t>
+            </a:r>
+            <a:endParaRPr lang="ko-KR" altLang="en-US" sz="3200" dirty="0">
+              <a:solidFill>
+                <a:schemeClr val="bg1"/>
+              </a:solidFill>
+            </a:endParaRPr>
+          </a:p>
+        </p:txBody>
+      </p:sp>
+      <p:sp>
+        <p:nvSpPr>
+          <p:cNvPr id="30" name="TextBox 29">
+            <a:extLst>
+              <a:ext uri="{FF2B5EF4-FFF2-40B4-BE49-F238E27FC236}">
+                <a16:creationId xmlns:a16="http://schemas.microsoft.com/office/drawing/2014/main" id="{45CFF3A7-CD76-46AB-813C-298CA0B6AF99}"/>
+              </a:ext>
+            </a:extLst>
+          </p:cNvPr>
+          <p:cNvSpPr txBox="1"/>
+          <p:nvPr/>
+        </p:nvSpPr>
+        <p:spPr>
+          <a:xfrm>
+            <a:off x="6906124" y="1652337"/>
+            <a:ext cx="3500039" cy="584775"/>
+          </a:xfrm>
+          <a:prstGeom prst="rect">
+            <a:avLst/>
+          </a:prstGeom>
+          <a:noFill/>
+        </p:spPr>
+        <p:txBody>
+          <a:bodyPr wrap="square" rtlCol="0">
+            <a:spAutoFit/>
+          </a:bodyPr>
+          <a:lstStyle/>
+          <a:p>
+            <a:r>
+              <a:rPr lang="en-US" altLang="ko-KR" sz="3200" dirty="0">
+                <a:solidFill>
+                  <a:schemeClr val="bg1"/>
+                </a:solidFill>
+              </a:rPr>
+              <a:t>11</a:t>
+            </a:r>
+            <a:r>
+              <a:rPr lang="ko-KR" altLang="en-US" sz="3200" dirty="0">
+                <a:solidFill>
+                  <a:schemeClr val="bg1"/>
+                </a:solidFill>
+              </a:rPr>
+              <a:t>개의 같은 </a:t>
+            </a:r>
+            <a:r>
+              <a:rPr lang="ko-KR" altLang="en-US" sz="3200" dirty="0" err="1">
+                <a:solidFill>
+                  <a:schemeClr val="bg1"/>
+                </a:solidFill>
+              </a:rPr>
+              <a:t>랜선</a:t>
+            </a:r>
+            <a:endParaRPr lang="ko-KR" altLang="en-US" sz="3200" dirty="0">
+              <a:solidFill>
+                <a:schemeClr val="bg1"/>
+              </a:solidFill>
+            </a:endParaRPr>
+          </a:p>
+        </p:txBody>
+      </p:sp>
+      <p:cxnSp>
+        <p:nvCxnSpPr>
+          <p:cNvPr id="5" name="직선 연결선 4">
+            <a:extLst>
+              <a:ext uri="{FF2B5EF4-FFF2-40B4-BE49-F238E27FC236}">
+                <a16:creationId xmlns:a16="http://schemas.microsoft.com/office/drawing/2014/main" id="{500FCA9F-1360-F371-4DA8-80306E74429F}"/>
+              </a:ext>
+            </a:extLst>
+          </p:cNvPr>
+          <p:cNvCxnSpPr>
+            <a:cxnSpLocks/>
+          </p:cNvCxnSpPr>
+          <p:nvPr/>
+        </p:nvCxnSpPr>
+        <p:spPr>
+          <a:xfrm>
+            <a:off x="2510594" y="2759242"/>
+            <a:ext cx="0" cy="2398295"/>
+          </a:xfrm>
+          <a:prstGeom prst="line">
+            <a:avLst/>
+          </a:prstGeom>
+        </p:spPr>
+        <p:style>
+          <a:lnRef idx="1">
+            <a:schemeClr val="accent1"/>
+          </a:lnRef>
+          <a:fillRef idx="0">
+            <a:schemeClr val="accent1"/>
+          </a:fillRef>
+          <a:effectRef idx="0">
+            <a:schemeClr val="accent1"/>
+          </a:effectRef>
+          <a:fontRef idx="minor">
+            <a:schemeClr val="tx1"/>
+          </a:fontRef>
+        </p:style>
+      </p:cxnSp>
+      <p:sp>
+        <p:nvSpPr>
+          <p:cNvPr id="9" name="화살표: 오른쪽 8">
+            <a:extLst>
+              <a:ext uri="{FF2B5EF4-FFF2-40B4-BE49-F238E27FC236}">
+                <a16:creationId xmlns:a16="http://schemas.microsoft.com/office/drawing/2014/main" id="{C8A270D0-9758-B56B-AEF5-E3690431D68F}"/>
+              </a:ext>
+            </a:extLst>
+          </p:cNvPr>
+          <p:cNvSpPr/>
+          <p:nvPr/>
+        </p:nvSpPr>
+        <p:spPr>
+          <a:xfrm>
+            <a:off x="4684295" y="3429000"/>
+            <a:ext cx="946482" cy="584775"/>
+          </a:xfrm>
+          <a:prstGeom prst="rightArrow">
+            <a:avLst/>
+          </a:prstGeom>
+        </p:spPr>
+        <p:style>
+          <a:lnRef idx="2">
+            <a:schemeClr val="accent1">
+              <a:shade val="50000"/>
+            </a:schemeClr>
+          </a:lnRef>
+          <a:fillRef idx="1">
+            <a:schemeClr val="accent1"/>
+          </a:fillRef>
+          <a:effectRef idx="0">
+            <a:schemeClr val="accent1"/>
+          </a:effectRef>
+          <a:fontRef idx="minor">
+            <a:schemeClr val="lt1"/>
+          </a:fontRef>
+        </p:style>
+        <p:txBody>
+          <a:bodyPr rtlCol="0" anchor="ctr"/>
+          <a:lstStyle/>
+          <a:p>
+            <a:pPr algn="ctr"/>
+            <a:endParaRPr lang="ko-KR" altLang="en-US"/>
+          </a:p>
+        </p:txBody>
+      </p:sp>
+      <p:cxnSp>
+        <p:nvCxnSpPr>
+          <p:cNvPr id="19" name="직선 연결선 18">
+            <a:extLst>
+              <a:ext uri="{FF2B5EF4-FFF2-40B4-BE49-F238E27FC236}">
+                <a16:creationId xmlns:a16="http://schemas.microsoft.com/office/drawing/2014/main" id="{DA14E23F-49FE-5F7C-EA74-14CA3188E6D1}"/>
+              </a:ext>
+            </a:extLst>
+          </p:cNvPr>
+          <p:cNvCxnSpPr>
+            <a:cxnSpLocks/>
+          </p:cNvCxnSpPr>
+          <p:nvPr/>
+        </p:nvCxnSpPr>
+        <p:spPr>
+          <a:xfrm>
+            <a:off x="6906124" y="3818021"/>
+            <a:ext cx="0" cy="1339516"/>
+          </a:xfrm>
+          <a:prstGeom prst="line">
+            <a:avLst/>
+          </a:prstGeom>
+        </p:spPr>
+        <p:style>
+          <a:lnRef idx="1">
+            <a:schemeClr val="accent1"/>
+          </a:lnRef>
+          <a:fillRef idx="0">
+            <a:schemeClr val="accent1"/>
+          </a:fillRef>
+          <a:effectRef idx="0">
+            <a:schemeClr val="accent1"/>
+          </a:effectRef>
+          <a:fontRef idx="minor">
+            <a:schemeClr val="tx1"/>
+          </a:fontRef>
+        </p:style>
+      </p:cxnSp>
+      <p:cxnSp>
+        <p:nvCxnSpPr>
+          <p:cNvPr id="20" name="직선 연결선 19">
+            <a:extLst>
+              <a:ext uri="{FF2B5EF4-FFF2-40B4-BE49-F238E27FC236}">
+                <a16:creationId xmlns:a16="http://schemas.microsoft.com/office/drawing/2014/main" id="{F87BE8AA-D3F8-9F97-2E8C-0C5C30DA3A98}"/>
+              </a:ext>
+            </a:extLst>
+          </p:cNvPr>
+          <p:cNvCxnSpPr>
+            <a:cxnSpLocks/>
+          </p:cNvCxnSpPr>
+          <p:nvPr/>
+        </p:nvCxnSpPr>
+        <p:spPr>
+          <a:xfrm>
+            <a:off x="7760375" y="3818021"/>
+            <a:ext cx="0" cy="1339516"/>
+          </a:xfrm>
+          <a:prstGeom prst="line">
+            <a:avLst/>
+          </a:prstGeom>
+        </p:spPr>
+        <p:style>
+          <a:lnRef idx="1">
+            <a:schemeClr val="accent1"/>
+          </a:lnRef>
+          <a:fillRef idx="0">
+            <a:schemeClr val="accent1"/>
+          </a:fillRef>
+          <a:effectRef idx="0">
+            <a:schemeClr val="accent1"/>
+          </a:effectRef>
+          <a:fontRef idx="minor">
+            <a:schemeClr val="tx1"/>
+          </a:fontRef>
+        </p:style>
+      </p:cxnSp>
+      <p:sp>
+        <p:nvSpPr>
+          <p:cNvPr id="34" name="TextBox 33">
+            <a:extLst>
+              <a:ext uri="{FF2B5EF4-FFF2-40B4-BE49-F238E27FC236}">
+                <a16:creationId xmlns:a16="http://schemas.microsoft.com/office/drawing/2014/main" id="{7DD4B1BE-0703-7E54-6FFE-209E7AA4B0A1}"/>
+              </a:ext>
+            </a:extLst>
+          </p:cNvPr>
+          <p:cNvSpPr txBox="1"/>
+          <p:nvPr/>
+        </p:nvSpPr>
+        <p:spPr>
+          <a:xfrm>
+            <a:off x="1236003" y="5333043"/>
+            <a:ext cx="3591909" cy="584775"/>
+          </a:xfrm>
+          <a:prstGeom prst="rect">
+            <a:avLst/>
+          </a:prstGeom>
+          <a:noFill/>
+        </p:spPr>
+        <p:txBody>
+          <a:bodyPr wrap="square" rtlCol="0">
+            <a:spAutoFit/>
+          </a:bodyPr>
+          <a:lstStyle/>
+          <a:p>
+            <a:r>
+              <a:rPr lang="en-US" altLang="ko-KR" sz="3200" dirty="0">
+                <a:solidFill>
+                  <a:schemeClr val="bg1"/>
+                </a:solidFill>
+              </a:rPr>
+              <a:t>802 743 457 539</a:t>
+            </a:r>
+            <a:endParaRPr lang="ko-KR" altLang="en-US" sz="3200" dirty="0">
+              <a:solidFill>
+                <a:schemeClr val="bg1"/>
+              </a:solidFill>
+            </a:endParaRPr>
+          </a:p>
+        </p:txBody>
+      </p:sp>
+      <p:sp>
+        <p:nvSpPr>
+          <p:cNvPr id="36" name="TextBox 35">
+            <a:extLst>
+              <a:ext uri="{FF2B5EF4-FFF2-40B4-BE49-F238E27FC236}">
+                <a16:creationId xmlns:a16="http://schemas.microsoft.com/office/drawing/2014/main" id="{8245B394-CF92-7176-162A-00506AF38ED7}"/>
+              </a:ext>
+            </a:extLst>
+          </p:cNvPr>
+          <p:cNvSpPr txBox="1"/>
+          <p:nvPr/>
+        </p:nvSpPr>
+        <p:spPr>
+          <a:xfrm>
+            <a:off x="6575278" y="5220748"/>
+            <a:ext cx="2584764" cy="584775"/>
+          </a:xfrm>
+          <a:prstGeom prst="rect">
+            <a:avLst/>
+          </a:prstGeom>
+          <a:noFill/>
+        </p:spPr>
+        <p:txBody>
+          <a:bodyPr wrap="square" rtlCol="0">
+            <a:spAutoFit/>
+          </a:bodyPr>
+          <a:lstStyle/>
+          <a:p>
+            <a:r>
+              <a:rPr lang="en-US" altLang="ko-KR" sz="3200" dirty="0">
+                <a:solidFill>
+                  <a:schemeClr val="bg1"/>
+                </a:solidFill>
+              </a:rPr>
+              <a:t>200 200 * 11</a:t>
+            </a:r>
+            <a:endParaRPr lang="ko-KR" altLang="en-US" sz="3200" dirty="0">
+              <a:solidFill>
+                <a:schemeClr val="bg1"/>
+              </a:solidFill>
+            </a:endParaRPr>
+          </a:p>
+        </p:txBody>
+      </p:sp>
+      <p:cxnSp>
+        <p:nvCxnSpPr>
+          <p:cNvPr id="42" name="직선 연결선 41">
+            <a:extLst>
+              <a:ext uri="{FF2B5EF4-FFF2-40B4-BE49-F238E27FC236}">
+                <a16:creationId xmlns:a16="http://schemas.microsoft.com/office/drawing/2014/main" id="{159297DB-54C7-3443-4631-5F0A30625A6D}"/>
+              </a:ext>
+            </a:extLst>
+          </p:cNvPr>
+          <p:cNvCxnSpPr>
+            <a:cxnSpLocks/>
+          </p:cNvCxnSpPr>
+          <p:nvPr/>
+        </p:nvCxnSpPr>
+        <p:spPr>
+          <a:xfrm>
+            <a:off x="3144257" y="3721387"/>
+            <a:ext cx="0" cy="1444171"/>
+          </a:xfrm>
+          <a:prstGeom prst="line">
+            <a:avLst/>
+          </a:prstGeom>
+        </p:spPr>
+        <p:style>
+          <a:lnRef idx="1">
+            <a:schemeClr val="accent1"/>
+          </a:lnRef>
+          <a:fillRef idx="0">
+            <a:schemeClr val="accent1"/>
+          </a:fillRef>
+          <a:effectRef idx="0">
+            <a:schemeClr val="accent1"/>
+          </a:effectRef>
+          <a:fontRef idx="minor">
+            <a:schemeClr val="tx1"/>
+          </a:fontRef>
+        </p:style>
+      </p:cxnSp>
+      <p:cxnSp>
+        <p:nvCxnSpPr>
+          <p:cNvPr id="43" name="직선 연결선 42">
+            <a:extLst>
+              <a:ext uri="{FF2B5EF4-FFF2-40B4-BE49-F238E27FC236}">
+                <a16:creationId xmlns:a16="http://schemas.microsoft.com/office/drawing/2014/main" id="{0B3B75A9-0A7A-0725-EB28-F1862587BDBD}"/>
+              </a:ext>
+            </a:extLst>
+          </p:cNvPr>
+          <p:cNvCxnSpPr/>
+          <p:nvPr/>
+        </p:nvCxnSpPr>
+        <p:spPr>
+          <a:xfrm>
+            <a:off x="1788699" y="2486527"/>
+            <a:ext cx="0" cy="2679031"/>
+          </a:xfrm>
+          <a:prstGeom prst="line">
+            <a:avLst/>
+          </a:prstGeom>
+        </p:spPr>
+        <p:style>
+          <a:lnRef idx="1">
+            <a:schemeClr val="accent1"/>
+          </a:lnRef>
+          <a:fillRef idx="0">
+            <a:schemeClr val="accent1"/>
+          </a:fillRef>
+          <a:effectRef idx="0">
+            <a:schemeClr val="accent1"/>
+          </a:effectRef>
+          <a:fontRef idx="minor">
+            <a:schemeClr val="tx1"/>
+          </a:fontRef>
+        </p:style>
+      </p:cxnSp>
+      <p:cxnSp>
+        <p:nvCxnSpPr>
+          <p:cNvPr id="44" name="직선 연결선 43">
+            <a:extLst>
+              <a:ext uri="{FF2B5EF4-FFF2-40B4-BE49-F238E27FC236}">
+                <a16:creationId xmlns:a16="http://schemas.microsoft.com/office/drawing/2014/main" id="{4CD7CB36-33F5-426B-7237-198E3FAA845A}"/>
+              </a:ext>
+            </a:extLst>
+          </p:cNvPr>
+          <p:cNvCxnSpPr>
+            <a:cxnSpLocks/>
+          </p:cNvCxnSpPr>
+          <p:nvPr/>
+        </p:nvCxnSpPr>
+        <p:spPr>
+          <a:xfrm>
+            <a:off x="3818026" y="3429000"/>
+            <a:ext cx="0" cy="1728536"/>
+          </a:xfrm>
+          <a:prstGeom prst="line">
+            <a:avLst/>
+          </a:prstGeom>
+        </p:spPr>
+        <p:style>
+          <a:lnRef idx="1">
+            <a:schemeClr val="accent1"/>
+          </a:lnRef>
+          <a:fillRef idx="0">
+            <a:schemeClr val="accent1"/>
+          </a:fillRef>
+          <a:effectRef idx="0">
+            <a:schemeClr val="accent1"/>
+          </a:effectRef>
+          <a:fontRef idx="minor">
+            <a:schemeClr val="tx1"/>
+          </a:fontRef>
+        </p:style>
+      </p:cxnSp>
+    </p:spTree>
+    <p:extLst>
+      <p:ext uri="{BB962C8B-B14F-4D97-AF65-F5344CB8AC3E}">
+        <p14:creationId xmlns:p14="http://schemas.microsoft.com/office/powerpoint/2010/main" val="3903026860"/>
+      </p:ext>
+    </p:extLst>
+  </p:cSld>
+  <p:clrMapOvr>
+    <a:masterClrMapping/>
+  </p:clrMapOvr>
+</p:sld>
+</file>
+
+<file path=ppt/slides/slide21.xml><?xml version="1.0" encoding="utf-8"?>
+<p:sld xmlns:a="http://schemas.openxmlformats.org/drawingml/2006/main" xmlns:r="http://schemas.openxmlformats.org/officeDocument/2006/relationships" xmlns:p="http://schemas.openxmlformats.org/presentationml/2006/main">
+  <p:cSld>
+    <p:bg>
+      <p:bgPr>
+        <a:solidFill>
+          <a:schemeClr val="tx2">
+            <a:lumMod val="50000"/>
+          </a:schemeClr>
+        </a:solidFill>
+        <a:effectLst/>
+      </p:bgPr>
+    </p:bg>
+    <p:spTree>
+      <p:nvGrpSpPr>
+        <p:cNvPr id="1" name=""/>
+        <p:cNvGrpSpPr/>
+        <p:nvPr/>
+      </p:nvGrpSpPr>
+      <p:grpSpPr>
+        <a:xfrm>
+          <a:off x="0" y="0"/>
+          <a:ext cx="0" cy="0"/>
+          <a:chOff x="0" y="0"/>
+          <a:chExt cx="0" cy="0"/>
+        </a:xfrm>
+      </p:grpSpPr>
+      <p:sp>
+        <p:nvSpPr>
+          <p:cNvPr id="4" name="TextBox 3">
+            <a:extLst>
+              <a:ext uri="{FF2B5EF4-FFF2-40B4-BE49-F238E27FC236}">
+                <a16:creationId xmlns:a16="http://schemas.microsoft.com/office/drawing/2014/main" id="{0ADD3736-29C5-49A6-8C10-696896947644}"/>
+              </a:ext>
+            </a:extLst>
+          </p:cNvPr>
+          <p:cNvSpPr txBox="1"/>
+          <p:nvPr/>
+        </p:nvSpPr>
+        <p:spPr>
+          <a:xfrm>
+            <a:off x="312821" y="312821"/>
+            <a:ext cx="11228892" cy="584775"/>
+          </a:xfrm>
+          <a:prstGeom prst="rect">
+            <a:avLst/>
+          </a:prstGeom>
+          <a:noFill/>
+        </p:spPr>
+        <p:txBody>
+          <a:bodyPr wrap="square" rtlCol="0">
+            <a:spAutoFit/>
+          </a:bodyPr>
+          <a:lstStyle/>
+          <a:p>
+            <a:r>
+              <a:rPr lang="ko-KR" altLang="en-US" sz="3200" dirty="0">
+                <a:solidFill>
+                  <a:schemeClr val="bg1"/>
+                </a:solidFill>
+              </a:rPr>
+              <a:t>● </a:t>
+            </a:r>
+            <a:r>
+              <a:rPr lang="en-US" altLang="ko-KR" sz="3200" dirty="0" err="1">
+                <a:solidFill>
+                  <a:schemeClr val="bg1"/>
+                </a:solidFill>
+              </a:rPr>
+              <a:t>Boj</a:t>
+            </a:r>
+            <a:r>
+              <a:rPr lang="en-US" altLang="ko-KR" sz="3200" dirty="0">
+                <a:solidFill>
+                  <a:schemeClr val="bg1"/>
+                </a:solidFill>
+              </a:rPr>
+              <a:t> – 1654 </a:t>
+            </a:r>
+            <a:r>
+              <a:rPr lang="ko-KR" altLang="en-US" sz="3200" dirty="0" err="1">
+                <a:solidFill>
+                  <a:schemeClr val="bg1"/>
+                </a:solidFill>
+              </a:rPr>
+              <a:t>랜선</a:t>
+            </a:r>
+            <a:r>
+              <a:rPr lang="ko-KR" altLang="en-US" sz="3200" dirty="0">
+                <a:solidFill>
+                  <a:schemeClr val="bg1"/>
+                </a:solidFill>
+              </a:rPr>
+              <a:t> 자르기</a:t>
+            </a:r>
+            <a:r>
+              <a:rPr lang="en-US" altLang="ko-KR" sz="3200" dirty="0">
+                <a:solidFill>
+                  <a:schemeClr val="bg1"/>
+                </a:solidFill>
+              </a:rPr>
+              <a:t>.</a:t>
+            </a:r>
+            <a:endParaRPr lang="ko-KR" altLang="en-US" sz="3200" dirty="0">
+              <a:solidFill>
+                <a:schemeClr val="bg1"/>
+              </a:solidFill>
+            </a:endParaRPr>
+          </a:p>
+        </p:txBody>
+      </p:sp>
+      <p:cxnSp>
+        <p:nvCxnSpPr>
+          <p:cNvPr id="7" name="직선 화살표 연결선 6">
+            <a:extLst>
+              <a:ext uri="{FF2B5EF4-FFF2-40B4-BE49-F238E27FC236}">
+                <a16:creationId xmlns:a16="http://schemas.microsoft.com/office/drawing/2014/main" id="{E1A41471-946F-8725-3256-BAD448B060A6}"/>
+              </a:ext>
+            </a:extLst>
+          </p:cNvPr>
+          <p:cNvCxnSpPr>
+            <a:cxnSpLocks/>
+          </p:cNvCxnSpPr>
+          <p:nvPr/>
+        </p:nvCxnSpPr>
+        <p:spPr>
+          <a:xfrm flipV="1">
+            <a:off x="2021305" y="2310063"/>
+            <a:ext cx="0" cy="3128211"/>
+          </a:xfrm>
+          <a:prstGeom prst="straightConnector1">
+            <a:avLst/>
+          </a:prstGeom>
+          <a:ln>
+            <a:solidFill>
+              <a:schemeClr val="bg1">
+                <a:lumMod val="85000"/>
+              </a:schemeClr>
+            </a:solidFill>
+            <a:tailEnd type="triangle"/>
+          </a:ln>
+        </p:spPr>
+        <p:style>
+          <a:lnRef idx="1">
+            <a:schemeClr val="accent1"/>
+          </a:lnRef>
+          <a:fillRef idx="0">
+            <a:schemeClr val="accent1"/>
+          </a:fillRef>
+          <a:effectRef idx="0">
+            <a:schemeClr val="accent1"/>
+          </a:effectRef>
+          <a:fontRef idx="minor">
+            <a:schemeClr val="tx1"/>
+          </a:fontRef>
+        </p:style>
+      </p:cxnSp>
+      <p:cxnSp>
+        <p:nvCxnSpPr>
+          <p:cNvPr id="21" name="직선 화살표 연결선 20">
+            <a:extLst>
+              <a:ext uri="{FF2B5EF4-FFF2-40B4-BE49-F238E27FC236}">
+                <a16:creationId xmlns:a16="http://schemas.microsoft.com/office/drawing/2014/main" id="{C114F223-33AD-4042-8123-EEDFCAE5E958}"/>
+              </a:ext>
+            </a:extLst>
+          </p:cNvPr>
+          <p:cNvCxnSpPr>
+            <a:cxnSpLocks/>
+          </p:cNvCxnSpPr>
+          <p:nvPr/>
+        </p:nvCxnSpPr>
+        <p:spPr>
+          <a:xfrm>
+            <a:off x="1459832" y="5197642"/>
+            <a:ext cx="8710863" cy="0"/>
+          </a:xfrm>
+          <a:prstGeom prst="straightConnector1">
+            <a:avLst/>
+          </a:prstGeom>
+          <a:ln>
+            <a:solidFill>
+              <a:schemeClr val="bg1">
+                <a:lumMod val="85000"/>
+              </a:schemeClr>
+            </a:solidFill>
+            <a:tailEnd type="triangle"/>
+          </a:ln>
+        </p:spPr>
+        <p:style>
+          <a:lnRef idx="1">
+            <a:schemeClr val="accent1"/>
+          </a:lnRef>
+          <a:fillRef idx="0">
+            <a:schemeClr val="accent1"/>
+          </a:fillRef>
+          <a:effectRef idx="0">
+            <a:schemeClr val="accent1"/>
+          </a:effectRef>
+          <a:fontRef idx="minor">
+            <a:schemeClr val="tx1"/>
+          </a:fontRef>
+        </p:style>
+      </p:cxnSp>
+      <p:sp>
+        <p:nvSpPr>
+          <p:cNvPr id="23" name="TextBox 22">
+            <a:extLst>
+              <a:ext uri="{FF2B5EF4-FFF2-40B4-BE49-F238E27FC236}">
+                <a16:creationId xmlns:a16="http://schemas.microsoft.com/office/drawing/2014/main" id="{5A2547FB-34B1-FA89-7935-6DB082CC8ADD}"/>
+              </a:ext>
+            </a:extLst>
+          </p:cNvPr>
+          <p:cNvSpPr txBox="1"/>
+          <p:nvPr/>
+        </p:nvSpPr>
+        <p:spPr>
+          <a:xfrm>
+            <a:off x="1331506" y="1621211"/>
+            <a:ext cx="2197756" cy="584775"/>
+          </a:xfrm>
+          <a:prstGeom prst="rect">
+            <a:avLst/>
+          </a:prstGeom>
+          <a:noFill/>
+        </p:spPr>
+        <p:txBody>
+          <a:bodyPr wrap="square" rtlCol="0">
+            <a:spAutoFit/>
+          </a:bodyPr>
+          <a:lstStyle/>
+          <a:p>
+            <a:r>
+              <a:rPr lang="ko-KR" altLang="en-US" sz="3200">
+                <a:solidFill>
+                  <a:schemeClr val="bg1"/>
+                </a:solidFill>
+              </a:rPr>
+              <a:t>개수</a:t>
+            </a:r>
+            <a:endParaRPr lang="ko-KR" altLang="en-US" sz="3200" dirty="0">
+              <a:solidFill>
+                <a:schemeClr val="bg1"/>
+              </a:solidFill>
+            </a:endParaRPr>
+          </a:p>
+        </p:txBody>
+      </p:sp>
+      <p:sp>
+        <p:nvSpPr>
+          <p:cNvPr id="24" name="TextBox 23">
+            <a:extLst>
+              <a:ext uri="{FF2B5EF4-FFF2-40B4-BE49-F238E27FC236}">
+                <a16:creationId xmlns:a16="http://schemas.microsoft.com/office/drawing/2014/main" id="{054CF5FB-3966-06E5-9F55-E5E7DCDB2DD8}"/>
+              </a:ext>
+            </a:extLst>
+          </p:cNvPr>
+          <p:cNvSpPr txBox="1"/>
+          <p:nvPr/>
+        </p:nvSpPr>
+        <p:spPr>
+          <a:xfrm>
+            <a:off x="9633290" y="5390148"/>
+            <a:ext cx="2197756" cy="584775"/>
+          </a:xfrm>
+          <a:prstGeom prst="rect">
+            <a:avLst/>
+          </a:prstGeom>
+          <a:noFill/>
+        </p:spPr>
+        <p:txBody>
+          <a:bodyPr wrap="square" rtlCol="0">
+            <a:spAutoFit/>
+          </a:bodyPr>
+          <a:lstStyle/>
+          <a:p>
+            <a:r>
+              <a:rPr lang="ko-KR" altLang="en-US" sz="3200" dirty="0" err="1">
+                <a:solidFill>
+                  <a:schemeClr val="bg1"/>
+                </a:solidFill>
+              </a:rPr>
+              <a:t>랜선</a:t>
+            </a:r>
+            <a:r>
+              <a:rPr lang="ko-KR" altLang="en-US" sz="3200" dirty="0">
+                <a:solidFill>
+                  <a:schemeClr val="bg1"/>
+                </a:solidFill>
+              </a:rPr>
+              <a:t> 길이</a:t>
+            </a:r>
+          </a:p>
+        </p:txBody>
+      </p:sp>
+      <p:sp>
+        <p:nvSpPr>
+          <p:cNvPr id="33" name="자유형: 도형 32">
+            <a:extLst>
+              <a:ext uri="{FF2B5EF4-FFF2-40B4-BE49-F238E27FC236}">
+                <a16:creationId xmlns:a16="http://schemas.microsoft.com/office/drawing/2014/main" id="{F2D8FC9F-1029-0C50-4A3F-65C0292EBBF0}"/>
+              </a:ext>
+            </a:extLst>
+          </p:cNvPr>
+          <p:cNvSpPr/>
+          <p:nvPr/>
+        </p:nvSpPr>
+        <p:spPr>
+          <a:xfrm>
+            <a:off x="2743200" y="2582779"/>
+            <a:ext cx="5662863" cy="2374232"/>
+          </a:xfrm>
+          <a:custGeom>
+            <a:avLst/>
+            <a:gdLst>
+              <a:gd name="connsiteX0" fmla="*/ 0 w 5662863"/>
+              <a:gd name="connsiteY0" fmla="*/ 0 h 2374232"/>
+              <a:gd name="connsiteX1" fmla="*/ 1620253 w 5662863"/>
+              <a:gd name="connsiteY1" fmla="*/ 1700463 h 2374232"/>
+              <a:gd name="connsiteX2" fmla="*/ 5662863 w 5662863"/>
+              <a:gd name="connsiteY2" fmla="*/ 2374232 h 2374232"/>
+            </a:gdLst>
+            <a:ahLst/>
+            <a:cxnLst>
+              <a:cxn ang="0">
+                <a:pos x="connsiteX0" y="connsiteY0"/>
+              </a:cxn>
+              <a:cxn ang="0">
+                <a:pos x="connsiteX1" y="connsiteY1"/>
+              </a:cxn>
+              <a:cxn ang="0">
+                <a:pos x="connsiteX2" y="connsiteY2"/>
+              </a:cxn>
+            </a:cxnLst>
+            <a:rect l="l" t="t" r="r" b="b"/>
+            <a:pathLst>
+              <a:path w="5662863" h="2374232">
+                <a:moveTo>
+                  <a:pt x="0" y="0"/>
+                </a:moveTo>
+                <a:cubicBezTo>
+                  <a:pt x="338221" y="652379"/>
+                  <a:pt x="676443" y="1304758"/>
+                  <a:pt x="1620253" y="1700463"/>
+                </a:cubicBezTo>
+                <a:cubicBezTo>
+                  <a:pt x="2564064" y="2096168"/>
+                  <a:pt x="4113463" y="2235200"/>
+                  <a:pt x="5662863" y="2374232"/>
+                </a:cubicBezTo>
+              </a:path>
+            </a:pathLst>
+          </a:custGeom>
+          <a:noFill/>
+        </p:spPr>
+        <p:style>
+          <a:lnRef idx="2">
+            <a:schemeClr val="accent1">
+              <a:shade val="50000"/>
+            </a:schemeClr>
+          </a:lnRef>
+          <a:fillRef idx="1">
+            <a:schemeClr val="accent1"/>
+          </a:fillRef>
+          <a:effectRef idx="0">
+            <a:schemeClr val="accent1"/>
+          </a:effectRef>
+          <a:fontRef idx="minor">
+            <a:schemeClr val="lt1"/>
+          </a:fontRef>
+        </p:style>
+        <p:txBody>
+          <a:bodyPr rtlCol="0" anchor="ctr"/>
+          <a:lstStyle/>
+          <a:p>
+            <a:pPr algn="ctr"/>
+            <a:endParaRPr lang="ko-KR" altLang="en-US"/>
+          </a:p>
+        </p:txBody>
+      </p:sp>
+      <p:cxnSp>
+        <p:nvCxnSpPr>
+          <p:cNvPr id="37" name="직선 연결선 36">
+            <a:extLst>
+              <a:ext uri="{FF2B5EF4-FFF2-40B4-BE49-F238E27FC236}">
+                <a16:creationId xmlns:a16="http://schemas.microsoft.com/office/drawing/2014/main" id="{344D197E-F6FA-B883-AF5F-3EE55B4B9574}"/>
+              </a:ext>
+            </a:extLst>
+          </p:cNvPr>
+          <p:cNvCxnSpPr>
+            <a:cxnSpLocks/>
+            <a:stCxn id="33" idx="1"/>
+          </p:cNvCxnSpPr>
+          <p:nvPr/>
+        </p:nvCxnSpPr>
+        <p:spPr>
+          <a:xfrm>
+            <a:off x="4363453" y="4283242"/>
+            <a:ext cx="0" cy="1155031"/>
+          </a:xfrm>
+          <a:prstGeom prst="line">
+            <a:avLst/>
+          </a:prstGeom>
+        </p:spPr>
+        <p:style>
+          <a:lnRef idx="1">
+            <a:schemeClr val="accent2"/>
+          </a:lnRef>
+          <a:fillRef idx="0">
+            <a:schemeClr val="accent2"/>
+          </a:fillRef>
+          <a:effectRef idx="0">
+            <a:schemeClr val="accent2"/>
+          </a:effectRef>
+          <a:fontRef idx="minor">
+            <a:schemeClr val="tx1"/>
+          </a:fontRef>
+        </p:style>
+      </p:cxnSp>
+      <p:sp>
+        <p:nvSpPr>
+          <p:cNvPr id="45" name="TextBox 44">
+            <a:extLst>
+              <a:ext uri="{FF2B5EF4-FFF2-40B4-BE49-F238E27FC236}">
+                <a16:creationId xmlns:a16="http://schemas.microsoft.com/office/drawing/2014/main" id="{E1D11ADD-1E7F-4E36-FDE4-575554F77123}"/>
+              </a:ext>
+            </a:extLst>
+          </p:cNvPr>
+          <p:cNvSpPr txBox="1"/>
+          <p:nvPr/>
+        </p:nvSpPr>
+        <p:spPr>
+          <a:xfrm>
+            <a:off x="1459832" y="3889252"/>
+            <a:ext cx="2197756" cy="584775"/>
+          </a:xfrm>
+          <a:prstGeom prst="rect">
+            <a:avLst/>
+          </a:prstGeom>
+          <a:noFill/>
+        </p:spPr>
+        <p:txBody>
+          <a:bodyPr wrap="square" rtlCol="0">
+            <a:spAutoFit/>
+          </a:bodyPr>
+          <a:lstStyle/>
+          <a:p>
+            <a:r>
+              <a:rPr lang="en-US" altLang="ko-KR" sz="3200" dirty="0">
+                <a:solidFill>
+                  <a:schemeClr val="bg1"/>
+                </a:solidFill>
+              </a:rPr>
+              <a:t>N</a:t>
+            </a:r>
+            <a:endParaRPr lang="ko-KR" altLang="en-US" sz="3200" dirty="0">
+              <a:solidFill>
+                <a:schemeClr val="bg1"/>
+              </a:solidFill>
+            </a:endParaRPr>
+          </a:p>
+        </p:txBody>
+      </p:sp>
+      <p:sp>
+        <p:nvSpPr>
+          <p:cNvPr id="46" name="TextBox 45">
+            <a:extLst>
+              <a:ext uri="{FF2B5EF4-FFF2-40B4-BE49-F238E27FC236}">
+                <a16:creationId xmlns:a16="http://schemas.microsoft.com/office/drawing/2014/main" id="{CD41A1FA-7938-537E-0E4F-D1BBAA891041}"/>
+              </a:ext>
+            </a:extLst>
+          </p:cNvPr>
+          <p:cNvSpPr txBox="1"/>
+          <p:nvPr/>
+        </p:nvSpPr>
+        <p:spPr>
+          <a:xfrm>
+            <a:off x="4082716" y="5420511"/>
+            <a:ext cx="2197756" cy="584775"/>
+          </a:xfrm>
+          <a:prstGeom prst="rect">
+            <a:avLst/>
+          </a:prstGeom>
+          <a:noFill/>
+        </p:spPr>
+        <p:txBody>
+          <a:bodyPr wrap="square" rtlCol="0">
+            <a:spAutoFit/>
+          </a:bodyPr>
+          <a:lstStyle/>
+          <a:p>
+            <a:r>
+              <a:rPr lang="ko-KR" altLang="en-US" sz="3200" dirty="0">
+                <a:solidFill>
+                  <a:schemeClr val="bg1"/>
+                </a:solidFill>
+              </a:rPr>
+              <a:t>답</a:t>
+            </a:r>
+          </a:p>
+        </p:txBody>
+      </p:sp>
+    </p:spTree>
+    <p:extLst>
+      <p:ext uri="{BB962C8B-B14F-4D97-AF65-F5344CB8AC3E}">
+        <p14:creationId xmlns:p14="http://schemas.microsoft.com/office/powerpoint/2010/main" val="3439022893"/>
+      </p:ext>
+    </p:extLst>
+  </p:cSld>
+  <p:clrMapOvr>
+    <a:masterClrMapping/>
+  </p:clrMapOvr>
+</p:sld>
+</file>
+
+<file path=ppt/slides/slide22.xml><?xml version="1.0" encoding="utf-8"?>
+<p:sld xmlns:a="http://schemas.openxmlformats.org/drawingml/2006/main" xmlns:r="http://schemas.openxmlformats.org/officeDocument/2006/relationships" xmlns:p="http://schemas.openxmlformats.org/presentationml/2006/main">
+  <p:cSld>
+    <p:bg>
+      <p:bgPr>
+        <a:solidFill>
+          <a:schemeClr val="tx2">
+            <a:lumMod val="50000"/>
+          </a:schemeClr>
+        </a:solidFill>
+        <a:effectLst/>
+      </p:bgPr>
+    </p:bg>
+    <p:spTree>
+      <p:nvGrpSpPr>
+        <p:cNvPr id="1" name=""/>
+        <p:cNvGrpSpPr/>
+        <p:nvPr/>
+      </p:nvGrpSpPr>
+      <p:grpSpPr>
+        <a:xfrm>
+          <a:off x="0" y="0"/>
+          <a:ext cx="0" cy="0"/>
+          <a:chOff x="0" y="0"/>
+          <a:chExt cx="0" cy="0"/>
+        </a:xfrm>
+      </p:grpSpPr>
+      <p:sp>
+        <p:nvSpPr>
+          <p:cNvPr id="4" name="TextBox 3">
+            <a:extLst>
+              <a:ext uri="{FF2B5EF4-FFF2-40B4-BE49-F238E27FC236}">
+                <a16:creationId xmlns:a16="http://schemas.microsoft.com/office/drawing/2014/main" id="{0ADD3736-29C5-49A6-8C10-696896947644}"/>
+              </a:ext>
+            </a:extLst>
+          </p:cNvPr>
+          <p:cNvSpPr txBox="1"/>
+          <p:nvPr/>
+        </p:nvSpPr>
+        <p:spPr>
+          <a:xfrm>
+            <a:off x="312821" y="312821"/>
+            <a:ext cx="11228892" cy="584775"/>
+          </a:xfrm>
+          <a:prstGeom prst="rect">
+            <a:avLst/>
+          </a:prstGeom>
+          <a:noFill/>
+        </p:spPr>
+        <p:txBody>
+          <a:bodyPr wrap="square" rtlCol="0">
+            <a:spAutoFit/>
+          </a:bodyPr>
+          <a:lstStyle/>
+          <a:p>
+            <a:r>
+              <a:rPr lang="ko-KR" altLang="en-US" sz="3200" dirty="0">
+                <a:solidFill>
+                  <a:schemeClr val="bg1"/>
+                </a:solidFill>
+              </a:rPr>
+              <a:t>● </a:t>
+            </a:r>
+            <a:r>
+              <a:rPr lang="en-US" altLang="ko-KR" sz="3200" dirty="0" err="1">
+                <a:solidFill>
+                  <a:schemeClr val="bg1"/>
+                </a:solidFill>
+              </a:rPr>
+              <a:t>Boj</a:t>
+            </a:r>
+            <a:r>
+              <a:rPr lang="en-US" altLang="ko-KR" sz="3200" dirty="0">
+                <a:solidFill>
+                  <a:schemeClr val="bg1"/>
+                </a:solidFill>
+              </a:rPr>
+              <a:t> – 1654 </a:t>
+            </a:r>
+            <a:r>
+              <a:rPr lang="ko-KR" altLang="en-US" sz="3200" dirty="0" err="1">
+                <a:solidFill>
+                  <a:schemeClr val="bg1"/>
+                </a:solidFill>
+              </a:rPr>
+              <a:t>랜선</a:t>
+            </a:r>
+            <a:r>
+              <a:rPr lang="ko-KR" altLang="en-US" sz="3200" dirty="0">
+                <a:solidFill>
+                  <a:schemeClr val="bg1"/>
+                </a:solidFill>
+              </a:rPr>
+              <a:t> 자르기</a:t>
+            </a:r>
+            <a:r>
+              <a:rPr lang="en-US" altLang="ko-KR" sz="3200" dirty="0">
+                <a:solidFill>
+                  <a:schemeClr val="bg1"/>
+                </a:solidFill>
+              </a:rPr>
+              <a:t>.</a:t>
+            </a:r>
+            <a:endParaRPr lang="ko-KR" altLang="en-US" sz="3200" dirty="0">
+              <a:solidFill>
+                <a:schemeClr val="bg1"/>
+              </a:solidFill>
+            </a:endParaRPr>
+          </a:p>
+        </p:txBody>
+      </p:sp>
+      <p:cxnSp>
+        <p:nvCxnSpPr>
+          <p:cNvPr id="7" name="직선 화살표 연결선 6">
+            <a:extLst>
+              <a:ext uri="{FF2B5EF4-FFF2-40B4-BE49-F238E27FC236}">
+                <a16:creationId xmlns:a16="http://schemas.microsoft.com/office/drawing/2014/main" id="{E1A41471-946F-8725-3256-BAD448B060A6}"/>
+              </a:ext>
+            </a:extLst>
+          </p:cNvPr>
+          <p:cNvCxnSpPr>
+            <a:cxnSpLocks/>
+          </p:cNvCxnSpPr>
+          <p:nvPr/>
+        </p:nvCxnSpPr>
+        <p:spPr>
+          <a:xfrm flipV="1">
+            <a:off x="2021305" y="2310063"/>
+            <a:ext cx="0" cy="3128211"/>
+          </a:xfrm>
+          <a:prstGeom prst="straightConnector1">
+            <a:avLst/>
+          </a:prstGeom>
+          <a:ln>
+            <a:solidFill>
+              <a:schemeClr val="bg1">
+                <a:lumMod val="85000"/>
+              </a:schemeClr>
+            </a:solidFill>
+            <a:tailEnd type="triangle"/>
+          </a:ln>
+        </p:spPr>
+        <p:style>
+          <a:lnRef idx="1">
+            <a:schemeClr val="accent1"/>
+          </a:lnRef>
+          <a:fillRef idx="0">
+            <a:schemeClr val="accent1"/>
+          </a:fillRef>
+          <a:effectRef idx="0">
+            <a:schemeClr val="accent1"/>
+          </a:effectRef>
+          <a:fontRef idx="minor">
+            <a:schemeClr val="tx1"/>
+          </a:fontRef>
+        </p:style>
+      </p:cxnSp>
+      <p:cxnSp>
+        <p:nvCxnSpPr>
+          <p:cNvPr id="21" name="직선 화살표 연결선 20">
+            <a:extLst>
+              <a:ext uri="{FF2B5EF4-FFF2-40B4-BE49-F238E27FC236}">
+                <a16:creationId xmlns:a16="http://schemas.microsoft.com/office/drawing/2014/main" id="{C114F223-33AD-4042-8123-EEDFCAE5E958}"/>
+              </a:ext>
+            </a:extLst>
+          </p:cNvPr>
+          <p:cNvCxnSpPr>
+            <a:cxnSpLocks/>
+          </p:cNvCxnSpPr>
+          <p:nvPr/>
+        </p:nvCxnSpPr>
+        <p:spPr>
+          <a:xfrm>
+            <a:off x="1459832" y="5197642"/>
+            <a:ext cx="8710863" cy="0"/>
+          </a:xfrm>
+          <a:prstGeom prst="straightConnector1">
+            <a:avLst/>
+          </a:prstGeom>
+          <a:ln>
+            <a:solidFill>
+              <a:schemeClr val="bg1">
+                <a:lumMod val="85000"/>
+              </a:schemeClr>
+            </a:solidFill>
+            <a:tailEnd type="triangle"/>
+          </a:ln>
+        </p:spPr>
+        <p:style>
+          <a:lnRef idx="1">
+            <a:schemeClr val="accent1"/>
+          </a:lnRef>
+          <a:fillRef idx="0">
+            <a:schemeClr val="accent1"/>
+          </a:fillRef>
+          <a:effectRef idx="0">
+            <a:schemeClr val="accent1"/>
+          </a:effectRef>
+          <a:fontRef idx="minor">
+            <a:schemeClr val="tx1"/>
+          </a:fontRef>
+        </p:style>
+      </p:cxnSp>
+      <p:sp>
+        <p:nvSpPr>
+          <p:cNvPr id="23" name="TextBox 22">
+            <a:extLst>
+              <a:ext uri="{FF2B5EF4-FFF2-40B4-BE49-F238E27FC236}">
+                <a16:creationId xmlns:a16="http://schemas.microsoft.com/office/drawing/2014/main" id="{5A2547FB-34B1-FA89-7935-6DB082CC8ADD}"/>
+              </a:ext>
+            </a:extLst>
+          </p:cNvPr>
+          <p:cNvSpPr txBox="1"/>
+          <p:nvPr/>
+        </p:nvSpPr>
+        <p:spPr>
+          <a:xfrm>
+            <a:off x="1331506" y="1621211"/>
+            <a:ext cx="2197756" cy="584775"/>
+          </a:xfrm>
+          <a:prstGeom prst="rect">
+            <a:avLst/>
+          </a:prstGeom>
+          <a:noFill/>
+        </p:spPr>
+        <p:txBody>
+          <a:bodyPr wrap="square" rtlCol="0">
+            <a:spAutoFit/>
+          </a:bodyPr>
+          <a:lstStyle/>
+          <a:p>
+            <a:r>
+              <a:rPr lang="ko-KR" altLang="en-US" sz="3200">
+                <a:solidFill>
+                  <a:schemeClr val="bg1"/>
+                </a:solidFill>
+              </a:rPr>
+              <a:t>개수</a:t>
+            </a:r>
+            <a:endParaRPr lang="ko-KR" altLang="en-US" sz="3200" dirty="0">
+              <a:solidFill>
+                <a:schemeClr val="bg1"/>
+              </a:solidFill>
+            </a:endParaRPr>
+          </a:p>
+        </p:txBody>
+      </p:sp>
+      <p:sp>
+        <p:nvSpPr>
+          <p:cNvPr id="24" name="TextBox 23">
+            <a:extLst>
+              <a:ext uri="{FF2B5EF4-FFF2-40B4-BE49-F238E27FC236}">
+                <a16:creationId xmlns:a16="http://schemas.microsoft.com/office/drawing/2014/main" id="{054CF5FB-3966-06E5-9F55-E5E7DCDB2DD8}"/>
+              </a:ext>
+            </a:extLst>
+          </p:cNvPr>
+          <p:cNvSpPr txBox="1"/>
+          <p:nvPr/>
+        </p:nvSpPr>
+        <p:spPr>
+          <a:xfrm>
+            <a:off x="9633290" y="5390148"/>
+            <a:ext cx="2197756" cy="584775"/>
+          </a:xfrm>
+          <a:prstGeom prst="rect">
+            <a:avLst/>
+          </a:prstGeom>
+          <a:noFill/>
+        </p:spPr>
+        <p:txBody>
+          <a:bodyPr wrap="square" rtlCol="0">
+            <a:spAutoFit/>
+          </a:bodyPr>
+          <a:lstStyle/>
+          <a:p>
+            <a:r>
+              <a:rPr lang="ko-KR" altLang="en-US" sz="3200" dirty="0" err="1">
+                <a:solidFill>
+                  <a:schemeClr val="bg1"/>
+                </a:solidFill>
+              </a:rPr>
+              <a:t>랜선</a:t>
+            </a:r>
+            <a:r>
+              <a:rPr lang="ko-KR" altLang="en-US" sz="3200" dirty="0">
+                <a:solidFill>
+                  <a:schemeClr val="bg1"/>
+                </a:solidFill>
+              </a:rPr>
+              <a:t> 길이</a:t>
+            </a:r>
+          </a:p>
+        </p:txBody>
+      </p:sp>
+      <p:sp>
+        <p:nvSpPr>
+          <p:cNvPr id="33" name="자유형: 도형 32">
+            <a:extLst>
+              <a:ext uri="{FF2B5EF4-FFF2-40B4-BE49-F238E27FC236}">
+                <a16:creationId xmlns:a16="http://schemas.microsoft.com/office/drawing/2014/main" id="{F2D8FC9F-1029-0C50-4A3F-65C0292EBBF0}"/>
+              </a:ext>
+            </a:extLst>
+          </p:cNvPr>
+          <p:cNvSpPr/>
+          <p:nvPr/>
+        </p:nvSpPr>
+        <p:spPr>
+          <a:xfrm>
+            <a:off x="2743200" y="2582779"/>
+            <a:ext cx="5662863" cy="2374232"/>
+          </a:xfrm>
+          <a:custGeom>
+            <a:avLst/>
+            <a:gdLst>
+              <a:gd name="connsiteX0" fmla="*/ 0 w 5662863"/>
+              <a:gd name="connsiteY0" fmla="*/ 0 h 2374232"/>
+              <a:gd name="connsiteX1" fmla="*/ 1620253 w 5662863"/>
+              <a:gd name="connsiteY1" fmla="*/ 1700463 h 2374232"/>
+              <a:gd name="connsiteX2" fmla="*/ 5662863 w 5662863"/>
+              <a:gd name="connsiteY2" fmla="*/ 2374232 h 2374232"/>
+            </a:gdLst>
+            <a:ahLst/>
+            <a:cxnLst>
+              <a:cxn ang="0">
+                <a:pos x="connsiteX0" y="connsiteY0"/>
+              </a:cxn>
+              <a:cxn ang="0">
+                <a:pos x="connsiteX1" y="connsiteY1"/>
+              </a:cxn>
+              <a:cxn ang="0">
+                <a:pos x="connsiteX2" y="connsiteY2"/>
+              </a:cxn>
+            </a:cxnLst>
+            <a:rect l="l" t="t" r="r" b="b"/>
+            <a:pathLst>
+              <a:path w="5662863" h="2374232">
+                <a:moveTo>
+                  <a:pt x="0" y="0"/>
+                </a:moveTo>
+                <a:cubicBezTo>
+                  <a:pt x="338221" y="652379"/>
+                  <a:pt x="676443" y="1304758"/>
+                  <a:pt x="1620253" y="1700463"/>
+                </a:cubicBezTo>
+                <a:cubicBezTo>
+                  <a:pt x="2564064" y="2096168"/>
+                  <a:pt x="4113463" y="2235200"/>
+                  <a:pt x="5662863" y="2374232"/>
+                </a:cubicBezTo>
+              </a:path>
+            </a:pathLst>
+          </a:custGeom>
+          <a:noFill/>
+        </p:spPr>
+        <p:style>
+          <a:lnRef idx="2">
+            <a:schemeClr val="accent1">
+              <a:shade val="50000"/>
+            </a:schemeClr>
+          </a:lnRef>
+          <a:fillRef idx="1">
+            <a:schemeClr val="accent1"/>
+          </a:fillRef>
+          <a:effectRef idx="0">
+            <a:schemeClr val="accent1"/>
+          </a:effectRef>
+          <a:fontRef idx="minor">
+            <a:schemeClr val="lt1"/>
+          </a:fontRef>
+        </p:style>
+        <p:txBody>
+          <a:bodyPr rtlCol="0" anchor="ctr"/>
+          <a:lstStyle/>
+          <a:p>
+            <a:pPr algn="ctr"/>
+            <a:endParaRPr lang="ko-KR" altLang="en-US"/>
+          </a:p>
+        </p:txBody>
+      </p:sp>
+      <p:cxnSp>
+        <p:nvCxnSpPr>
+          <p:cNvPr id="37" name="직선 연결선 36">
+            <a:extLst>
+              <a:ext uri="{FF2B5EF4-FFF2-40B4-BE49-F238E27FC236}">
+                <a16:creationId xmlns:a16="http://schemas.microsoft.com/office/drawing/2014/main" id="{344D197E-F6FA-B883-AF5F-3EE55B4B9574}"/>
+              </a:ext>
+            </a:extLst>
+          </p:cNvPr>
+          <p:cNvCxnSpPr>
+            <a:cxnSpLocks/>
+            <a:stCxn id="33" idx="1"/>
+          </p:cNvCxnSpPr>
+          <p:nvPr/>
+        </p:nvCxnSpPr>
+        <p:spPr>
+          <a:xfrm>
+            <a:off x="4363453" y="4283242"/>
+            <a:ext cx="0" cy="1155031"/>
+          </a:xfrm>
+          <a:prstGeom prst="line">
+            <a:avLst/>
+          </a:prstGeom>
+        </p:spPr>
+        <p:style>
+          <a:lnRef idx="1">
+            <a:schemeClr val="accent2"/>
+          </a:lnRef>
+          <a:fillRef idx="0">
+            <a:schemeClr val="accent2"/>
+          </a:fillRef>
+          <a:effectRef idx="0">
+            <a:schemeClr val="accent2"/>
+          </a:effectRef>
+          <a:fontRef idx="minor">
+            <a:schemeClr val="tx1"/>
+          </a:fontRef>
+        </p:style>
+      </p:cxnSp>
+      <p:sp>
+        <p:nvSpPr>
+          <p:cNvPr id="45" name="TextBox 44">
+            <a:extLst>
+              <a:ext uri="{FF2B5EF4-FFF2-40B4-BE49-F238E27FC236}">
+                <a16:creationId xmlns:a16="http://schemas.microsoft.com/office/drawing/2014/main" id="{E1D11ADD-1E7F-4E36-FDE4-575554F77123}"/>
+              </a:ext>
+            </a:extLst>
+          </p:cNvPr>
+          <p:cNvSpPr txBox="1"/>
+          <p:nvPr/>
+        </p:nvSpPr>
+        <p:spPr>
+          <a:xfrm>
+            <a:off x="1459832" y="3889252"/>
+            <a:ext cx="2197756" cy="584775"/>
+          </a:xfrm>
+          <a:prstGeom prst="rect">
+            <a:avLst/>
+          </a:prstGeom>
+          <a:noFill/>
+        </p:spPr>
+        <p:txBody>
+          <a:bodyPr wrap="square" rtlCol="0">
+            <a:spAutoFit/>
+          </a:bodyPr>
+          <a:lstStyle/>
+          <a:p>
+            <a:r>
+              <a:rPr lang="en-US" altLang="ko-KR" sz="3200" dirty="0">
+                <a:solidFill>
+                  <a:schemeClr val="bg1"/>
+                </a:solidFill>
+              </a:rPr>
+              <a:t>N</a:t>
+            </a:r>
+            <a:endParaRPr lang="ko-KR" altLang="en-US" sz="3200" dirty="0">
+              <a:solidFill>
+                <a:schemeClr val="bg1"/>
+              </a:solidFill>
+            </a:endParaRPr>
+          </a:p>
+        </p:txBody>
+      </p:sp>
+      <p:sp>
+        <p:nvSpPr>
+          <p:cNvPr id="46" name="TextBox 45">
+            <a:extLst>
+              <a:ext uri="{FF2B5EF4-FFF2-40B4-BE49-F238E27FC236}">
+                <a16:creationId xmlns:a16="http://schemas.microsoft.com/office/drawing/2014/main" id="{CD41A1FA-7938-537E-0E4F-D1BBAA891041}"/>
+              </a:ext>
+            </a:extLst>
+          </p:cNvPr>
+          <p:cNvSpPr txBox="1"/>
+          <p:nvPr/>
+        </p:nvSpPr>
+        <p:spPr>
+          <a:xfrm>
+            <a:off x="4082716" y="5420511"/>
+            <a:ext cx="2197756" cy="584775"/>
+          </a:xfrm>
+          <a:prstGeom prst="rect">
+            <a:avLst/>
+          </a:prstGeom>
+          <a:noFill/>
+        </p:spPr>
+        <p:txBody>
+          <a:bodyPr wrap="square" rtlCol="0">
+            <a:spAutoFit/>
+          </a:bodyPr>
+          <a:lstStyle/>
+          <a:p>
+            <a:r>
+              <a:rPr lang="ko-KR" altLang="en-US" sz="3200" dirty="0">
+                <a:solidFill>
+                  <a:schemeClr val="bg1"/>
+                </a:solidFill>
+              </a:rPr>
+              <a:t>답</a:t>
+            </a:r>
+          </a:p>
+        </p:txBody>
+      </p:sp>
+      <p:cxnSp>
+        <p:nvCxnSpPr>
+          <p:cNvPr id="3" name="직선 화살표 연결선 2">
+            <a:extLst>
+              <a:ext uri="{FF2B5EF4-FFF2-40B4-BE49-F238E27FC236}">
+                <a16:creationId xmlns:a16="http://schemas.microsoft.com/office/drawing/2014/main" id="{4280083F-BE9C-BB55-6AB7-65DCCDC3641D}"/>
+              </a:ext>
+            </a:extLst>
+          </p:cNvPr>
+          <p:cNvCxnSpPr/>
+          <p:nvPr/>
+        </p:nvCxnSpPr>
+        <p:spPr>
+          <a:xfrm flipV="1">
+            <a:off x="2711116" y="5261809"/>
+            <a:ext cx="0" cy="593559"/>
+          </a:xfrm>
+          <a:prstGeom prst="straightConnector1">
+            <a:avLst/>
+          </a:prstGeom>
+          <a:ln>
+            <a:solidFill>
+              <a:srgbClr val="FF0000"/>
+            </a:solidFill>
+            <a:tailEnd type="triangle"/>
+          </a:ln>
+        </p:spPr>
+        <p:style>
+          <a:lnRef idx="1">
+            <a:schemeClr val="accent2"/>
+          </a:lnRef>
+          <a:fillRef idx="0">
+            <a:schemeClr val="accent2"/>
+          </a:fillRef>
+          <a:effectRef idx="0">
+            <a:schemeClr val="accent2"/>
+          </a:effectRef>
+          <a:fontRef idx="minor">
+            <a:schemeClr val="tx1"/>
+          </a:fontRef>
+        </p:style>
+      </p:cxnSp>
+      <p:sp>
+        <p:nvSpPr>
+          <p:cNvPr id="13" name="TextBox 12">
+            <a:extLst>
+              <a:ext uri="{FF2B5EF4-FFF2-40B4-BE49-F238E27FC236}">
+                <a16:creationId xmlns:a16="http://schemas.microsoft.com/office/drawing/2014/main" id="{D8AE0244-E602-D57C-FB3E-042D6C2AC86B}"/>
+              </a:ext>
+            </a:extLst>
+          </p:cNvPr>
+          <p:cNvSpPr txBox="1"/>
+          <p:nvPr/>
+        </p:nvSpPr>
+        <p:spPr>
+          <a:xfrm>
+            <a:off x="2430384" y="5921257"/>
+            <a:ext cx="2197756" cy="584775"/>
+          </a:xfrm>
+          <a:prstGeom prst="rect">
+            <a:avLst/>
+          </a:prstGeom>
+          <a:noFill/>
+        </p:spPr>
+        <p:txBody>
+          <a:bodyPr wrap="square" rtlCol="0">
+            <a:spAutoFit/>
+          </a:bodyPr>
+          <a:lstStyle/>
+          <a:p>
+            <a:r>
+              <a:rPr lang="en-US" altLang="ko-KR" sz="3200" dirty="0" err="1">
+                <a:solidFill>
+                  <a:schemeClr val="bg1"/>
+                </a:solidFill>
+              </a:rPr>
+              <a:t>st</a:t>
+            </a:r>
+            <a:endParaRPr lang="ko-KR" altLang="en-US" sz="3200" dirty="0">
+              <a:solidFill>
+                <a:schemeClr val="bg1"/>
+              </a:solidFill>
+            </a:endParaRPr>
+          </a:p>
+        </p:txBody>
+      </p:sp>
+      <p:cxnSp>
+        <p:nvCxnSpPr>
+          <p:cNvPr id="14" name="직선 화살표 연결선 13">
+            <a:extLst>
+              <a:ext uri="{FF2B5EF4-FFF2-40B4-BE49-F238E27FC236}">
+                <a16:creationId xmlns:a16="http://schemas.microsoft.com/office/drawing/2014/main" id="{A35414BB-B248-16B7-A9E3-BDAB20078DF2}"/>
+              </a:ext>
+            </a:extLst>
+          </p:cNvPr>
+          <p:cNvCxnSpPr/>
+          <p:nvPr/>
+        </p:nvCxnSpPr>
+        <p:spPr>
+          <a:xfrm flipV="1">
+            <a:off x="8406063" y="5309934"/>
+            <a:ext cx="0" cy="593559"/>
+          </a:xfrm>
+          <a:prstGeom prst="straightConnector1">
+            <a:avLst/>
+          </a:prstGeom>
+          <a:ln>
+            <a:solidFill>
+              <a:srgbClr val="FF0000"/>
+            </a:solidFill>
+            <a:tailEnd type="triangle"/>
+          </a:ln>
+        </p:spPr>
+        <p:style>
+          <a:lnRef idx="1">
+            <a:schemeClr val="accent2"/>
+          </a:lnRef>
+          <a:fillRef idx="0">
+            <a:schemeClr val="accent2"/>
+          </a:fillRef>
+          <a:effectRef idx="0">
+            <a:schemeClr val="accent2"/>
+          </a:effectRef>
+          <a:fontRef idx="minor">
+            <a:schemeClr val="tx1"/>
+          </a:fontRef>
+        </p:style>
+      </p:cxnSp>
+      <p:sp>
+        <p:nvSpPr>
+          <p:cNvPr id="15" name="TextBox 14">
+            <a:extLst>
+              <a:ext uri="{FF2B5EF4-FFF2-40B4-BE49-F238E27FC236}">
+                <a16:creationId xmlns:a16="http://schemas.microsoft.com/office/drawing/2014/main" id="{F2A9B206-0F4B-D802-4F26-CD2136578072}"/>
+              </a:ext>
+            </a:extLst>
+          </p:cNvPr>
+          <p:cNvSpPr txBox="1"/>
+          <p:nvPr/>
+        </p:nvSpPr>
+        <p:spPr>
+          <a:xfrm>
+            <a:off x="8149395" y="5921257"/>
+            <a:ext cx="2197756" cy="584775"/>
+          </a:xfrm>
+          <a:prstGeom prst="rect">
+            <a:avLst/>
+          </a:prstGeom>
+          <a:noFill/>
+        </p:spPr>
+        <p:txBody>
+          <a:bodyPr wrap="square" rtlCol="0">
+            <a:spAutoFit/>
+          </a:bodyPr>
+          <a:lstStyle/>
+          <a:p>
+            <a:r>
+              <a:rPr lang="en-US" altLang="ko-KR" sz="3200" dirty="0" err="1">
+                <a:solidFill>
+                  <a:schemeClr val="bg1"/>
+                </a:solidFill>
+              </a:rPr>
+              <a:t>en</a:t>
+            </a:r>
+            <a:endParaRPr lang="ko-KR" altLang="en-US" sz="3200" dirty="0">
+              <a:solidFill>
+                <a:schemeClr val="bg1"/>
+              </a:solidFill>
+            </a:endParaRPr>
+          </a:p>
+        </p:txBody>
+      </p:sp>
+      <p:cxnSp>
+        <p:nvCxnSpPr>
+          <p:cNvPr id="16" name="직선 화살표 연결선 15">
+            <a:extLst>
+              <a:ext uri="{FF2B5EF4-FFF2-40B4-BE49-F238E27FC236}">
+                <a16:creationId xmlns:a16="http://schemas.microsoft.com/office/drawing/2014/main" id="{475D044C-D8A3-816E-55D6-CAD9DC23A322}"/>
+              </a:ext>
+            </a:extLst>
+          </p:cNvPr>
+          <p:cNvCxnSpPr/>
+          <p:nvPr/>
+        </p:nvCxnSpPr>
+        <p:spPr>
+          <a:xfrm flipV="1">
+            <a:off x="5534526" y="5319865"/>
+            <a:ext cx="0" cy="593559"/>
+          </a:xfrm>
+          <a:prstGeom prst="straightConnector1">
+            <a:avLst/>
+          </a:prstGeom>
+          <a:ln>
+            <a:solidFill>
+              <a:srgbClr val="FF0000"/>
+            </a:solidFill>
+            <a:tailEnd type="triangle"/>
+          </a:ln>
+        </p:spPr>
+        <p:style>
+          <a:lnRef idx="1">
+            <a:schemeClr val="accent2"/>
+          </a:lnRef>
+          <a:fillRef idx="0">
+            <a:schemeClr val="accent2"/>
+          </a:fillRef>
+          <a:effectRef idx="0">
+            <a:schemeClr val="accent2"/>
+          </a:effectRef>
+          <a:fontRef idx="minor">
+            <a:schemeClr val="tx1"/>
+          </a:fontRef>
+        </p:style>
+      </p:cxnSp>
+      <p:sp>
+        <p:nvSpPr>
+          <p:cNvPr id="17" name="TextBox 16">
+            <a:extLst>
+              <a:ext uri="{FF2B5EF4-FFF2-40B4-BE49-F238E27FC236}">
+                <a16:creationId xmlns:a16="http://schemas.microsoft.com/office/drawing/2014/main" id="{93DA027F-2A57-72E0-16D0-C1B4595A7B30}"/>
+              </a:ext>
+            </a:extLst>
+          </p:cNvPr>
+          <p:cNvSpPr txBox="1"/>
+          <p:nvPr/>
+        </p:nvSpPr>
+        <p:spPr>
+          <a:xfrm>
+            <a:off x="5093362" y="5896430"/>
+            <a:ext cx="2197756" cy="584775"/>
+          </a:xfrm>
+          <a:prstGeom prst="rect">
+            <a:avLst/>
+          </a:prstGeom>
+          <a:noFill/>
+        </p:spPr>
+        <p:txBody>
+          <a:bodyPr wrap="square" rtlCol="0">
+            <a:spAutoFit/>
+          </a:bodyPr>
+          <a:lstStyle/>
+          <a:p>
+            <a:r>
+              <a:rPr lang="en-US" altLang="ko-KR" sz="3200" dirty="0">
+                <a:solidFill>
+                  <a:schemeClr val="bg1"/>
+                </a:solidFill>
+              </a:rPr>
+              <a:t>mid</a:t>
+            </a:r>
+            <a:endParaRPr lang="ko-KR" altLang="en-US" sz="3200" dirty="0">
+              <a:solidFill>
+                <a:schemeClr val="bg1"/>
+              </a:solidFill>
+            </a:endParaRPr>
+          </a:p>
+        </p:txBody>
+      </p:sp>
+    </p:spTree>
+    <p:extLst>
+      <p:ext uri="{BB962C8B-B14F-4D97-AF65-F5344CB8AC3E}">
+        <p14:creationId xmlns:p14="http://schemas.microsoft.com/office/powerpoint/2010/main" val="2136106483"/>
+      </p:ext>
+    </p:extLst>
+  </p:cSld>
+  <p:clrMapOvr>
+    <a:masterClrMapping/>
+  </p:clrMapOvr>
+</p:sld>
+</file>
+
+<file path=ppt/slides/slide23.xml><?xml version="1.0" encoding="utf-8"?>
+<p:sld xmlns:a="http://schemas.openxmlformats.org/drawingml/2006/main" xmlns:r="http://schemas.openxmlformats.org/officeDocument/2006/relationships" xmlns:p="http://schemas.openxmlformats.org/presentationml/2006/main">
+  <p:cSld>
+    <p:bg>
+      <p:bgPr>
+        <a:solidFill>
+          <a:schemeClr val="tx2">
+            <a:lumMod val="50000"/>
+          </a:schemeClr>
+        </a:solidFill>
+        <a:effectLst/>
+      </p:bgPr>
+    </p:bg>
+    <p:spTree>
+      <p:nvGrpSpPr>
+        <p:cNvPr id="1" name=""/>
+        <p:cNvGrpSpPr/>
+        <p:nvPr/>
+      </p:nvGrpSpPr>
+      <p:grpSpPr>
+        <a:xfrm>
+          <a:off x="0" y="0"/>
+          <a:ext cx="0" cy="0"/>
+          <a:chOff x="0" y="0"/>
+          <a:chExt cx="0" cy="0"/>
+        </a:xfrm>
+      </p:grpSpPr>
+      <p:cxnSp>
+        <p:nvCxnSpPr>
+          <p:cNvPr id="7" name="직선 화살표 연결선 6">
+            <a:extLst>
+              <a:ext uri="{FF2B5EF4-FFF2-40B4-BE49-F238E27FC236}">
+                <a16:creationId xmlns:a16="http://schemas.microsoft.com/office/drawing/2014/main" id="{E1A41471-946F-8725-3256-BAD448B060A6}"/>
+              </a:ext>
+            </a:extLst>
+          </p:cNvPr>
+          <p:cNvCxnSpPr>
+            <a:cxnSpLocks/>
+          </p:cNvCxnSpPr>
+          <p:nvPr/>
+        </p:nvCxnSpPr>
+        <p:spPr>
+          <a:xfrm flipV="1">
+            <a:off x="2021305" y="2310063"/>
+            <a:ext cx="0" cy="3128211"/>
+          </a:xfrm>
+          <a:prstGeom prst="straightConnector1">
+            <a:avLst/>
+          </a:prstGeom>
+          <a:ln>
+            <a:solidFill>
+              <a:schemeClr val="bg1">
+                <a:lumMod val="85000"/>
+              </a:schemeClr>
+            </a:solidFill>
+            <a:tailEnd type="triangle"/>
+          </a:ln>
+        </p:spPr>
+        <p:style>
+          <a:lnRef idx="1">
+            <a:schemeClr val="accent1"/>
+          </a:lnRef>
+          <a:fillRef idx="0">
+            <a:schemeClr val="accent1"/>
+          </a:fillRef>
+          <a:effectRef idx="0">
+            <a:schemeClr val="accent1"/>
+          </a:effectRef>
+          <a:fontRef idx="minor">
+            <a:schemeClr val="tx1"/>
+          </a:fontRef>
+        </p:style>
+      </p:cxnSp>
+      <p:cxnSp>
+        <p:nvCxnSpPr>
+          <p:cNvPr id="21" name="직선 화살표 연결선 20">
+            <a:extLst>
+              <a:ext uri="{FF2B5EF4-FFF2-40B4-BE49-F238E27FC236}">
+                <a16:creationId xmlns:a16="http://schemas.microsoft.com/office/drawing/2014/main" id="{C114F223-33AD-4042-8123-EEDFCAE5E958}"/>
+              </a:ext>
+            </a:extLst>
+          </p:cNvPr>
+          <p:cNvCxnSpPr>
+            <a:cxnSpLocks/>
+          </p:cNvCxnSpPr>
+          <p:nvPr/>
+        </p:nvCxnSpPr>
+        <p:spPr>
+          <a:xfrm>
+            <a:off x="1459832" y="5197642"/>
+            <a:ext cx="8710863" cy="0"/>
+          </a:xfrm>
+          <a:prstGeom prst="straightConnector1">
+            <a:avLst/>
+          </a:prstGeom>
+          <a:ln>
+            <a:solidFill>
+              <a:schemeClr val="bg1">
+                <a:lumMod val="85000"/>
+              </a:schemeClr>
+            </a:solidFill>
+            <a:tailEnd type="triangle"/>
+          </a:ln>
+        </p:spPr>
+        <p:style>
+          <a:lnRef idx="1">
+            <a:schemeClr val="accent1"/>
+          </a:lnRef>
+          <a:fillRef idx="0">
+            <a:schemeClr val="accent1"/>
+          </a:fillRef>
+          <a:effectRef idx="0">
+            <a:schemeClr val="accent1"/>
+          </a:effectRef>
+          <a:fontRef idx="minor">
+            <a:schemeClr val="tx1"/>
+          </a:fontRef>
+        </p:style>
+      </p:cxnSp>
+      <p:sp>
+        <p:nvSpPr>
+          <p:cNvPr id="23" name="TextBox 22">
+            <a:extLst>
+              <a:ext uri="{FF2B5EF4-FFF2-40B4-BE49-F238E27FC236}">
+                <a16:creationId xmlns:a16="http://schemas.microsoft.com/office/drawing/2014/main" id="{5A2547FB-34B1-FA89-7935-6DB082CC8ADD}"/>
+              </a:ext>
+            </a:extLst>
+          </p:cNvPr>
+          <p:cNvSpPr txBox="1"/>
+          <p:nvPr/>
+        </p:nvSpPr>
+        <p:spPr>
+          <a:xfrm>
+            <a:off x="1331506" y="1621211"/>
+            <a:ext cx="2197756" cy="584775"/>
+          </a:xfrm>
+          <a:prstGeom prst="rect">
+            <a:avLst/>
+          </a:prstGeom>
+          <a:noFill/>
+        </p:spPr>
+        <p:txBody>
+          <a:bodyPr wrap="square" rtlCol="0">
+            <a:spAutoFit/>
+          </a:bodyPr>
+          <a:lstStyle/>
+          <a:p>
+            <a:r>
+              <a:rPr lang="ko-KR" altLang="en-US" sz="3200">
+                <a:solidFill>
+                  <a:schemeClr val="bg1"/>
+                </a:solidFill>
+              </a:rPr>
+              <a:t>개수</a:t>
+            </a:r>
+            <a:endParaRPr lang="ko-KR" altLang="en-US" sz="3200" dirty="0">
+              <a:solidFill>
+                <a:schemeClr val="bg1"/>
+              </a:solidFill>
+            </a:endParaRPr>
+          </a:p>
+        </p:txBody>
+      </p:sp>
+      <p:sp>
+        <p:nvSpPr>
+          <p:cNvPr id="24" name="TextBox 23">
+            <a:extLst>
+              <a:ext uri="{FF2B5EF4-FFF2-40B4-BE49-F238E27FC236}">
+                <a16:creationId xmlns:a16="http://schemas.microsoft.com/office/drawing/2014/main" id="{054CF5FB-3966-06E5-9F55-E5E7DCDB2DD8}"/>
+              </a:ext>
+            </a:extLst>
+          </p:cNvPr>
+          <p:cNvSpPr txBox="1"/>
+          <p:nvPr/>
+        </p:nvSpPr>
+        <p:spPr>
+          <a:xfrm>
+            <a:off x="9633290" y="5390148"/>
+            <a:ext cx="2197756" cy="584775"/>
+          </a:xfrm>
+          <a:prstGeom prst="rect">
+            <a:avLst/>
+          </a:prstGeom>
+          <a:noFill/>
+        </p:spPr>
+        <p:txBody>
+          <a:bodyPr wrap="square" rtlCol="0">
+            <a:spAutoFit/>
+          </a:bodyPr>
+          <a:lstStyle/>
+          <a:p>
+            <a:r>
+              <a:rPr lang="ko-KR" altLang="en-US" sz="3200" dirty="0" err="1">
+                <a:solidFill>
+                  <a:schemeClr val="bg1"/>
+                </a:solidFill>
+              </a:rPr>
+              <a:t>랜선</a:t>
+            </a:r>
+            <a:r>
+              <a:rPr lang="ko-KR" altLang="en-US" sz="3200" dirty="0">
+                <a:solidFill>
+                  <a:schemeClr val="bg1"/>
+                </a:solidFill>
+              </a:rPr>
+              <a:t> 길이</a:t>
+            </a:r>
+          </a:p>
+        </p:txBody>
+      </p:sp>
+      <p:sp>
+        <p:nvSpPr>
+          <p:cNvPr id="33" name="자유형: 도형 32">
+            <a:extLst>
+              <a:ext uri="{FF2B5EF4-FFF2-40B4-BE49-F238E27FC236}">
+                <a16:creationId xmlns:a16="http://schemas.microsoft.com/office/drawing/2014/main" id="{F2D8FC9F-1029-0C50-4A3F-65C0292EBBF0}"/>
+              </a:ext>
+            </a:extLst>
+          </p:cNvPr>
+          <p:cNvSpPr/>
+          <p:nvPr/>
+        </p:nvSpPr>
+        <p:spPr>
+          <a:xfrm>
+            <a:off x="2743200" y="2582779"/>
+            <a:ext cx="5662863" cy="2374232"/>
+          </a:xfrm>
+          <a:custGeom>
+            <a:avLst/>
+            <a:gdLst>
+              <a:gd name="connsiteX0" fmla="*/ 0 w 5662863"/>
+              <a:gd name="connsiteY0" fmla="*/ 0 h 2374232"/>
+              <a:gd name="connsiteX1" fmla="*/ 1620253 w 5662863"/>
+              <a:gd name="connsiteY1" fmla="*/ 1700463 h 2374232"/>
+              <a:gd name="connsiteX2" fmla="*/ 5662863 w 5662863"/>
+              <a:gd name="connsiteY2" fmla="*/ 2374232 h 2374232"/>
+            </a:gdLst>
+            <a:ahLst/>
+            <a:cxnLst>
+              <a:cxn ang="0">
+                <a:pos x="connsiteX0" y="connsiteY0"/>
+              </a:cxn>
+              <a:cxn ang="0">
+                <a:pos x="connsiteX1" y="connsiteY1"/>
+              </a:cxn>
+              <a:cxn ang="0">
+                <a:pos x="connsiteX2" y="connsiteY2"/>
+              </a:cxn>
+            </a:cxnLst>
+            <a:rect l="l" t="t" r="r" b="b"/>
+            <a:pathLst>
+              <a:path w="5662863" h="2374232">
+                <a:moveTo>
+                  <a:pt x="0" y="0"/>
+                </a:moveTo>
+                <a:cubicBezTo>
+                  <a:pt x="338221" y="652379"/>
+                  <a:pt x="676443" y="1304758"/>
+                  <a:pt x="1620253" y="1700463"/>
+                </a:cubicBezTo>
+                <a:cubicBezTo>
+                  <a:pt x="2564064" y="2096168"/>
+                  <a:pt x="4113463" y="2235200"/>
+                  <a:pt x="5662863" y="2374232"/>
+                </a:cubicBezTo>
+              </a:path>
+            </a:pathLst>
+          </a:custGeom>
+          <a:noFill/>
+        </p:spPr>
+        <p:style>
+          <a:lnRef idx="2">
+            <a:schemeClr val="accent1">
+              <a:shade val="50000"/>
+            </a:schemeClr>
+          </a:lnRef>
+          <a:fillRef idx="1">
+            <a:schemeClr val="accent1"/>
+          </a:fillRef>
+          <a:effectRef idx="0">
+            <a:schemeClr val="accent1"/>
+          </a:effectRef>
+          <a:fontRef idx="minor">
+            <a:schemeClr val="lt1"/>
+          </a:fontRef>
+        </p:style>
+        <p:txBody>
+          <a:bodyPr rtlCol="0" anchor="ctr"/>
+          <a:lstStyle/>
+          <a:p>
+            <a:pPr algn="ctr"/>
+            <a:endParaRPr lang="ko-KR" altLang="en-US"/>
+          </a:p>
+        </p:txBody>
+      </p:sp>
+      <p:cxnSp>
+        <p:nvCxnSpPr>
+          <p:cNvPr id="37" name="직선 연결선 36">
+            <a:extLst>
+              <a:ext uri="{FF2B5EF4-FFF2-40B4-BE49-F238E27FC236}">
+                <a16:creationId xmlns:a16="http://schemas.microsoft.com/office/drawing/2014/main" id="{344D197E-F6FA-B883-AF5F-3EE55B4B9574}"/>
+              </a:ext>
+            </a:extLst>
+          </p:cNvPr>
+          <p:cNvCxnSpPr>
+            <a:cxnSpLocks/>
+            <a:stCxn id="33" idx="1"/>
+          </p:cNvCxnSpPr>
+          <p:nvPr/>
+        </p:nvCxnSpPr>
+        <p:spPr>
+          <a:xfrm>
+            <a:off x="4363453" y="4283242"/>
+            <a:ext cx="0" cy="1155031"/>
+          </a:xfrm>
+          <a:prstGeom prst="line">
+            <a:avLst/>
+          </a:prstGeom>
+        </p:spPr>
+        <p:style>
+          <a:lnRef idx="1">
+            <a:schemeClr val="accent2"/>
+          </a:lnRef>
+          <a:fillRef idx="0">
+            <a:schemeClr val="accent2"/>
+          </a:fillRef>
+          <a:effectRef idx="0">
+            <a:schemeClr val="accent2"/>
+          </a:effectRef>
+          <a:fontRef idx="minor">
+            <a:schemeClr val="tx1"/>
+          </a:fontRef>
+        </p:style>
+      </p:cxnSp>
+      <p:sp>
+        <p:nvSpPr>
+          <p:cNvPr id="45" name="TextBox 44">
+            <a:extLst>
+              <a:ext uri="{FF2B5EF4-FFF2-40B4-BE49-F238E27FC236}">
+                <a16:creationId xmlns:a16="http://schemas.microsoft.com/office/drawing/2014/main" id="{E1D11ADD-1E7F-4E36-FDE4-575554F77123}"/>
+              </a:ext>
+            </a:extLst>
+          </p:cNvPr>
+          <p:cNvSpPr txBox="1"/>
+          <p:nvPr/>
+        </p:nvSpPr>
+        <p:spPr>
+          <a:xfrm>
+            <a:off x="1459832" y="3889252"/>
+            <a:ext cx="2197756" cy="584775"/>
+          </a:xfrm>
+          <a:prstGeom prst="rect">
+            <a:avLst/>
+          </a:prstGeom>
+          <a:noFill/>
+        </p:spPr>
+        <p:txBody>
+          <a:bodyPr wrap="square" rtlCol="0">
+            <a:spAutoFit/>
+          </a:bodyPr>
+          <a:lstStyle/>
+          <a:p>
+            <a:r>
+              <a:rPr lang="en-US" altLang="ko-KR" sz="3200" dirty="0">
+                <a:solidFill>
+                  <a:schemeClr val="bg1"/>
+                </a:solidFill>
+              </a:rPr>
+              <a:t>N</a:t>
+            </a:r>
+            <a:endParaRPr lang="ko-KR" altLang="en-US" sz="3200" dirty="0">
+              <a:solidFill>
+                <a:schemeClr val="bg1"/>
+              </a:solidFill>
+            </a:endParaRPr>
+          </a:p>
+        </p:txBody>
+      </p:sp>
+      <p:sp>
+        <p:nvSpPr>
+          <p:cNvPr id="46" name="TextBox 45">
+            <a:extLst>
+              <a:ext uri="{FF2B5EF4-FFF2-40B4-BE49-F238E27FC236}">
+                <a16:creationId xmlns:a16="http://schemas.microsoft.com/office/drawing/2014/main" id="{CD41A1FA-7938-537E-0E4F-D1BBAA891041}"/>
+              </a:ext>
+            </a:extLst>
+          </p:cNvPr>
+          <p:cNvSpPr txBox="1"/>
+          <p:nvPr/>
+        </p:nvSpPr>
+        <p:spPr>
+          <a:xfrm>
+            <a:off x="4082716" y="5420511"/>
+            <a:ext cx="2197756" cy="584775"/>
+          </a:xfrm>
+          <a:prstGeom prst="rect">
+            <a:avLst/>
+          </a:prstGeom>
+          <a:noFill/>
+        </p:spPr>
+        <p:txBody>
+          <a:bodyPr wrap="square" rtlCol="0">
+            <a:spAutoFit/>
+          </a:bodyPr>
+          <a:lstStyle/>
+          <a:p>
+            <a:r>
+              <a:rPr lang="ko-KR" altLang="en-US" sz="3200" dirty="0">
+                <a:solidFill>
+                  <a:schemeClr val="bg1"/>
+                </a:solidFill>
+              </a:rPr>
+              <a:t>답</a:t>
+            </a:r>
+          </a:p>
+        </p:txBody>
+      </p:sp>
+      <p:cxnSp>
+        <p:nvCxnSpPr>
+          <p:cNvPr id="3" name="직선 화살표 연결선 2">
+            <a:extLst>
+              <a:ext uri="{FF2B5EF4-FFF2-40B4-BE49-F238E27FC236}">
+                <a16:creationId xmlns:a16="http://schemas.microsoft.com/office/drawing/2014/main" id="{4280083F-BE9C-BB55-6AB7-65DCCDC3641D}"/>
+              </a:ext>
+            </a:extLst>
+          </p:cNvPr>
+          <p:cNvCxnSpPr/>
+          <p:nvPr/>
+        </p:nvCxnSpPr>
+        <p:spPr>
+          <a:xfrm flipV="1">
+            <a:off x="2711116" y="5261809"/>
+            <a:ext cx="0" cy="593559"/>
+          </a:xfrm>
+          <a:prstGeom prst="straightConnector1">
+            <a:avLst/>
+          </a:prstGeom>
+          <a:ln>
+            <a:solidFill>
+              <a:srgbClr val="FF0000"/>
+            </a:solidFill>
+            <a:tailEnd type="triangle"/>
+          </a:ln>
+        </p:spPr>
+        <p:style>
+          <a:lnRef idx="1">
+            <a:schemeClr val="accent2"/>
+          </a:lnRef>
+          <a:fillRef idx="0">
+            <a:schemeClr val="accent2"/>
+          </a:fillRef>
+          <a:effectRef idx="0">
+            <a:schemeClr val="accent2"/>
+          </a:effectRef>
+          <a:fontRef idx="minor">
+            <a:schemeClr val="tx1"/>
+          </a:fontRef>
+        </p:style>
+      </p:cxnSp>
+      <p:sp>
+        <p:nvSpPr>
+          <p:cNvPr id="13" name="TextBox 12">
+            <a:extLst>
+              <a:ext uri="{FF2B5EF4-FFF2-40B4-BE49-F238E27FC236}">
+                <a16:creationId xmlns:a16="http://schemas.microsoft.com/office/drawing/2014/main" id="{D8AE0244-E602-D57C-FB3E-042D6C2AC86B}"/>
+              </a:ext>
+            </a:extLst>
+          </p:cNvPr>
+          <p:cNvSpPr txBox="1"/>
+          <p:nvPr/>
+        </p:nvSpPr>
+        <p:spPr>
+          <a:xfrm>
+            <a:off x="2430384" y="5921257"/>
+            <a:ext cx="2197756" cy="584775"/>
+          </a:xfrm>
+          <a:prstGeom prst="rect">
+            <a:avLst/>
+          </a:prstGeom>
+          <a:noFill/>
+        </p:spPr>
+        <p:txBody>
+          <a:bodyPr wrap="square" rtlCol="0">
+            <a:spAutoFit/>
+          </a:bodyPr>
+          <a:lstStyle/>
+          <a:p>
+            <a:r>
+              <a:rPr lang="en-US" altLang="ko-KR" sz="3200" dirty="0" err="1">
+                <a:solidFill>
+                  <a:schemeClr val="bg1"/>
+                </a:solidFill>
+              </a:rPr>
+              <a:t>st</a:t>
+            </a:r>
+            <a:endParaRPr lang="ko-KR" altLang="en-US" sz="3200" dirty="0">
+              <a:solidFill>
+                <a:schemeClr val="bg1"/>
+              </a:solidFill>
+            </a:endParaRPr>
+          </a:p>
+        </p:txBody>
+      </p:sp>
+      <p:cxnSp>
+        <p:nvCxnSpPr>
+          <p:cNvPr id="14" name="직선 화살표 연결선 13">
+            <a:extLst>
+              <a:ext uri="{FF2B5EF4-FFF2-40B4-BE49-F238E27FC236}">
+                <a16:creationId xmlns:a16="http://schemas.microsoft.com/office/drawing/2014/main" id="{A35414BB-B248-16B7-A9E3-BDAB20078DF2}"/>
+              </a:ext>
+            </a:extLst>
+          </p:cNvPr>
+          <p:cNvCxnSpPr/>
+          <p:nvPr/>
+        </p:nvCxnSpPr>
+        <p:spPr>
+          <a:xfrm flipV="1">
+            <a:off x="8406063" y="5309934"/>
+            <a:ext cx="0" cy="593559"/>
+          </a:xfrm>
+          <a:prstGeom prst="straightConnector1">
+            <a:avLst/>
+          </a:prstGeom>
+          <a:ln>
+            <a:solidFill>
+              <a:srgbClr val="FF0000"/>
+            </a:solidFill>
+            <a:tailEnd type="triangle"/>
+          </a:ln>
+        </p:spPr>
+        <p:style>
+          <a:lnRef idx="1">
+            <a:schemeClr val="accent2"/>
+          </a:lnRef>
+          <a:fillRef idx="0">
+            <a:schemeClr val="accent2"/>
+          </a:fillRef>
+          <a:effectRef idx="0">
+            <a:schemeClr val="accent2"/>
+          </a:effectRef>
+          <a:fontRef idx="minor">
+            <a:schemeClr val="tx1"/>
+          </a:fontRef>
+        </p:style>
+      </p:cxnSp>
+      <p:sp>
+        <p:nvSpPr>
+          <p:cNvPr id="15" name="TextBox 14">
+            <a:extLst>
+              <a:ext uri="{FF2B5EF4-FFF2-40B4-BE49-F238E27FC236}">
+                <a16:creationId xmlns:a16="http://schemas.microsoft.com/office/drawing/2014/main" id="{F2A9B206-0F4B-D802-4F26-CD2136578072}"/>
+              </a:ext>
+            </a:extLst>
+          </p:cNvPr>
+          <p:cNvSpPr txBox="1"/>
+          <p:nvPr/>
+        </p:nvSpPr>
+        <p:spPr>
+          <a:xfrm>
+            <a:off x="8149395" y="5921257"/>
+            <a:ext cx="2197756" cy="584775"/>
+          </a:xfrm>
+          <a:prstGeom prst="rect">
+            <a:avLst/>
+          </a:prstGeom>
+          <a:noFill/>
+        </p:spPr>
+        <p:txBody>
+          <a:bodyPr wrap="square" rtlCol="0">
+            <a:spAutoFit/>
+          </a:bodyPr>
+          <a:lstStyle/>
+          <a:p>
+            <a:r>
+              <a:rPr lang="en-US" altLang="ko-KR" sz="3200" dirty="0" err="1">
+                <a:solidFill>
+                  <a:schemeClr val="bg1"/>
+                </a:solidFill>
+              </a:rPr>
+              <a:t>en</a:t>
+            </a:r>
+            <a:endParaRPr lang="ko-KR" altLang="en-US" sz="3200" dirty="0">
+              <a:solidFill>
+                <a:schemeClr val="bg1"/>
+              </a:solidFill>
+            </a:endParaRPr>
+          </a:p>
+        </p:txBody>
+      </p:sp>
+      <p:cxnSp>
+        <p:nvCxnSpPr>
+          <p:cNvPr id="16" name="직선 화살표 연결선 15">
+            <a:extLst>
+              <a:ext uri="{FF2B5EF4-FFF2-40B4-BE49-F238E27FC236}">
+                <a16:creationId xmlns:a16="http://schemas.microsoft.com/office/drawing/2014/main" id="{475D044C-D8A3-816E-55D6-CAD9DC23A322}"/>
+              </a:ext>
+            </a:extLst>
+          </p:cNvPr>
+          <p:cNvCxnSpPr/>
+          <p:nvPr/>
+        </p:nvCxnSpPr>
+        <p:spPr>
+          <a:xfrm flipV="1">
+            <a:off x="5534526" y="5319865"/>
+            <a:ext cx="0" cy="593559"/>
+          </a:xfrm>
+          <a:prstGeom prst="straightConnector1">
+            <a:avLst/>
+          </a:prstGeom>
+          <a:ln>
+            <a:solidFill>
+              <a:srgbClr val="FF0000"/>
+            </a:solidFill>
+            <a:tailEnd type="triangle"/>
+          </a:ln>
+        </p:spPr>
+        <p:style>
+          <a:lnRef idx="1">
+            <a:schemeClr val="accent2"/>
+          </a:lnRef>
+          <a:fillRef idx="0">
+            <a:schemeClr val="accent2"/>
+          </a:fillRef>
+          <a:effectRef idx="0">
+            <a:schemeClr val="accent2"/>
+          </a:effectRef>
+          <a:fontRef idx="minor">
+            <a:schemeClr val="tx1"/>
+          </a:fontRef>
+        </p:style>
+      </p:cxnSp>
+      <p:sp>
+        <p:nvSpPr>
+          <p:cNvPr id="17" name="TextBox 16">
+            <a:extLst>
+              <a:ext uri="{FF2B5EF4-FFF2-40B4-BE49-F238E27FC236}">
+                <a16:creationId xmlns:a16="http://schemas.microsoft.com/office/drawing/2014/main" id="{93DA027F-2A57-72E0-16D0-C1B4595A7B30}"/>
+              </a:ext>
+            </a:extLst>
+          </p:cNvPr>
+          <p:cNvSpPr txBox="1"/>
+          <p:nvPr/>
+        </p:nvSpPr>
+        <p:spPr>
+          <a:xfrm>
+            <a:off x="5093362" y="5896430"/>
+            <a:ext cx="2197756" cy="584775"/>
+          </a:xfrm>
+          <a:prstGeom prst="rect">
+            <a:avLst/>
+          </a:prstGeom>
+          <a:noFill/>
+        </p:spPr>
+        <p:txBody>
+          <a:bodyPr wrap="square" rtlCol="0">
+            <a:spAutoFit/>
+          </a:bodyPr>
+          <a:lstStyle/>
+          <a:p>
+            <a:r>
+              <a:rPr lang="en-US" altLang="ko-KR" sz="3200" dirty="0">
+                <a:solidFill>
+                  <a:schemeClr val="bg1"/>
+                </a:solidFill>
+              </a:rPr>
+              <a:t>mid</a:t>
+            </a:r>
+            <a:endParaRPr lang="ko-KR" altLang="en-US" sz="3200" dirty="0">
+              <a:solidFill>
+                <a:schemeClr val="bg1"/>
+              </a:solidFill>
+            </a:endParaRPr>
+          </a:p>
+        </p:txBody>
+      </p:sp>
+    </p:spTree>
+    <p:extLst>
+      <p:ext uri="{BB962C8B-B14F-4D97-AF65-F5344CB8AC3E}">
+        <p14:creationId xmlns:p14="http://schemas.microsoft.com/office/powerpoint/2010/main" val="2933344826"/>
+      </p:ext>
+    </p:extLst>
+  </p:cSld>
+  <p:clrMapOvr>
+    <a:masterClrMapping/>
+  </p:clrMapOvr>
+</p:sld>
+</file>
+
 <file path=ppt/slides/slide3.xml><?xml version="1.0" encoding="utf-8"?>
 <p:sld xmlns:a="http://schemas.openxmlformats.org/drawingml/2006/main" xmlns:r="http://schemas.openxmlformats.org/officeDocument/2006/relationships" xmlns:p="http://schemas.openxmlformats.org/presentationml/2006/main">
   <p:cSld>

</xml_diff>